<commit_message>
Added blank pages for whiteboard
</commit_message>
<xml_diff>
--- a/bigbluebutton-config/web/default.pptx
+++ b/bigbluebutton-config/web/default.pptx
@@ -5,10 +5,15 @@
     <p:sldMasterId id="2147483648" r:id="rId1"/>
   </p:sldMasterIdLst>
   <p:notesMasterIdLst>
-    <p:notesMasterId r:id="rId3"/>
+    <p:notesMasterId r:id="rId8"/>
   </p:notesMasterIdLst>
   <p:sldIdLst>
     <p:sldId id="256" r:id="rId2"/>
+    <p:sldId id="257" r:id="rId3"/>
+    <p:sldId id="258" r:id="rId4"/>
+    <p:sldId id="259" r:id="rId5"/>
+    <p:sldId id="260" r:id="rId6"/>
+    <p:sldId id="261" r:id="rId7"/>
   </p:sldIdLst>
   <p:sldSz cx="24384000" cy="13716000"/>
   <p:notesSz cx="6858000" cy="9144000"/>
@@ -5093,6 +5098,631 @@
 </p:sld>
 </file>
 
+<file path=ppt/slides/slide2.xml><?xml version="1.0" encoding="utf-8"?>
+<p:sld xmlns:a="http://schemas.openxmlformats.org/drawingml/2006/main" xmlns:r="http://schemas.openxmlformats.org/officeDocument/2006/relationships" xmlns:p="http://schemas.openxmlformats.org/presentationml/2006/main">
+  <p:cSld>
+    <p:spTree>
+      <p:nvGrpSpPr>
+        <p:cNvPr id="1" name=""/>
+        <p:cNvGrpSpPr/>
+        <p:nvPr/>
+      </p:nvGrpSpPr>
+      <p:grpSpPr>
+        <a:xfrm>
+          <a:off x="0" y="0"/>
+          <a:ext cx="0" cy="0"/>
+          <a:chOff x="0" y="0"/>
+          <a:chExt cx="0" cy="0"/>
+        </a:xfrm>
+      </p:grpSpPr>
+      <p:sp>
+        <p:nvSpPr>
+          <p:cNvPr id="6" name="TextBox 5"/>
+          <p:cNvSpPr txBox="1"/>
+          <p:nvPr/>
+        </p:nvSpPr>
+        <p:spPr>
+          <a:xfrm>
+            <a:off x="6237111" y="12728316"/>
+            <a:ext cx="13095111" cy="564257"/>
+          </a:xfrm>
+          <a:prstGeom prst="rect">
+            <a:avLst/>
+          </a:prstGeom>
+          <a:noFill/>
+          <a:ln w="12700" cap="flat">
+            <a:noFill/>
+            <a:miter lim="400000"/>
+          </a:ln>
+          <a:effectLst/>
+          <a:sp3d/>
+        </p:spPr>
+        <p:style>
+          <a:lnRef idx="0">
+            <a:scrgbClr r="0" g="0" b="0"/>
+          </a:lnRef>
+          <a:fillRef idx="0">
+            <a:scrgbClr r="0" g="0" b="0"/>
+          </a:fillRef>
+          <a:effectRef idx="0">
+            <a:scrgbClr r="0" g="0" b="0"/>
+          </a:effectRef>
+          <a:fontRef idx="none"/>
+        </p:style>
+        <p:txBody>
+          <a:bodyPr rot="0" spcFirstLastPara="1" vertOverflow="overflow" horzOverflow="overflow" vert="horz" wrap="square" lIns="50800" tIns="50800" rIns="50800" bIns="50800" numCol="1" spcCol="38100" rtlCol="0" anchor="ctr">
+            <a:spAutoFit/>
+          </a:bodyPr>
+          <a:lstStyle/>
+          <a:p>
+            <a:pPr marL="0" marR="0" indent="0" algn="ctr" defTabSz="825500" rtl="0" fontAlgn="auto" latinLnBrk="0" hangingPunct="0">
+              <a:lnSpc>
+                <a:spcPct val="100000"/>
+              </a:lnSpc>
+              <a:spcBef>
+                <a:spcPts val="0"/>
+              </a:spcBef>
+              <a:spcAft>
+                <a:spcPts val="0"/>
+              </a:spcAft>
+              <a:buClrTx/>
+              <a:buSzTx/>
+              <a:buFontTx/>
+              <a:buNone/>
+              <a:tabLst/>
+            </a:pPr>
+            <a:r>
+              <a:rPr kumimoji="0" lang="en-US" sz="3000" b="1" i="0" u="none" strike="noStrike" cap="none" spc="0" normalizeH="0" baseline="0" dirty="0" smtClean="0">
+                <a:ln>
+                  <a:noFill/>
+                </a:ln>
+                <a:solidFill>
+                  <a:srgbClr val="000000"/>
+                </a:solidFill>
+                <a:effectLst/>
+                <a:uFillTx/>
+                <a:latin typeface="Helvetica Neue"/>
+                <a:ea typeface="Helvetica Neue"/>
+                <a:cs typeface="Helvetica Neue"/>
+                <a:sym typeface="Helvetica Neue"/>
+              </a:rPr>
+              <a:t>Thi</a:t>
+            </a:r>
+            <a:r>
+              <a:rPr lang="en-US" dirty="0" smtClean="0"/>
+              <a:t>s slide left blank for whiteboard</a:t>
+            </a:r>
+            <a:endParaRPr kumimoji="0" lang="en-US" sz="3000" b="1" i="0" u="none" strike="noStrike" cap="none" spc="0" normalizeH="0" baseline="0" dirty="0">
+              <a:ln>
+                <a:noFill/>
+              </a:ln>
+              <a:solidFill>
+                <a:srgbClr val="000000"/>
+              </a:solidFill>
+              <a:effectLst/>
+              <a:uFillTx/>
+              <a:latin typeface="Helvetica Neue"/>
+              <a:ea typeface="Helvetica Neue"/>
+              <a:cs typeface="Helvetica Neue"/>
+              <a:sym typeface="Helvetica Neue"/>
+            </a:endParaRPr>
+          </a:p>
+        </p:txBody>
+      </p:sp>
+    </p:spTree>
+    <p:extLst>
+      <p:ext uri="{BB962C8B-B14F-4D97-AF65-F5344CB8AC3E}">
+        <p14:creationId xmlns:p14="http://schemas.microsoft.com/office/powerpoint/2010/main" val="2227736033"/>
+      </p:ext>
+    </p:extLst>
+  </p:cSld>
+  <p:clrMapOvr>
+    <a:masterClrMapping/>
+  </p:clrMapOvr>
+  <p:transition xmlns:p14="http://schemas.microsoft.com/office/powerpoint/2010/main" spd="med"/>
+</p:sld>
+</file>
+
+<file path=ppt/slides/slide3.xml><?xml version="1.0" encoding="utf-8"?>
+<p:sld xmlns:a="http://schemas.openxmlformats.org/drawingml/2006/main" xmlns:r="http://schemas.openxmlformats.org/officeDocument/2006/relationships" xmlns:p="http://schemas.openxmlformats.org/presentationml/2006/main">
+  <p:cSld>
+    <p:spTree>
+      <p:nvGrpSpPr>
+        <p:cNvPr id="1" name=""/>
+        <p:cNvGrpSpPr/>
+        <p:nvPr/>
+      </p:nvGrpSpPr>
+      <p:grpSpPr>
+        <a:xfrm>
+          <a:off x="0" y="0"/>
+          <a:ext cx="0" cy="0"/>
+          <a:chOff x="0" y="0"/>
+          <a:chExt cx="0" cy="0"/>
+        </a:xfrm>
+      </p:grpSpPr>
+      <p:sp>
+        <p:nvSpPr>
+          <p:cNvPr id="6" name="TextBox 5"/>
+          <p:cNvSpPr txBox="1"/>
+          <p:nvPr/>
+        </p:nvSpPr>
+        <p:spPr>
+          <a:xfrm>
+            <a:off x="6237111" y="12728316"/>
+            <a:ext cx="13095111" cy="564257"/>
+          </a:xfrm>
+          <a:prstGeom prst="rect">
+            <a:avLst/>
+          </a:prstGeom>
+          <a:noFill/>
+          <a:ln w="12700" cap="flat">
+            <a:noFill/>
+            <a:miter lim="400000"/>
+          </a:ln>
+          <a:effectLst/>
+          <a:sp3d/>
+        </p:spPr>
+        <p:style>
+          <a:lnRef idx="0">
+            <a:scrgbClr r="0" g="0" b="0"/>
+          </a:lnRef>
+          <a:fillRef idx="0">
+            <a:scrgbClr r="0" g="0" b="0"/>
+          </a:fillRef>
+          <a:effectRef idx="0">
+            <a:scrgbClr r="0" g="0" b="0"/>
+          </a:effectRef>
+          <a:fontRef idx="none"/>
+        </p:style>
+        <p:txBody>
+          <a:bodyPr rot="0" spcFirstLastPara="1" vertOverflow="overflow" horzOverflow="overflow" vert="horz" wrap="square" lIns="50800" tIns="50800" rIns="50800" bIns="50800" numCol="1" spcCol="38100" rtlCol="0" anchor="ctr">
+            <a:spAutoFit/>
+          </a:bodyPr>
+          <a:lstStyle/>
+          <a:p>
+            <a:pPr marL="0" marR="0" indent="0" algn="ctr" defTabSz="825500" rtl="0" fontAlgn="auto" latinLnBrk="0" hangingPunct="0">
+              <a:lnSpc>
+                <a:spcPct val="100000"/>
+              </a:lnSpc>
+              <a:spcBef>
+                <a:spcPts val="0"/>
+              </a:spcBef>
+              <a:spcAft>
+                <a:spcPts val="0"/>
+              </a:spcAft>
+              <a:buClrTx/>
+              <a:buSzTx/>
+              <a:buFontTx/>
+              <a:buNone/>
+              <a:tabLst/>
+            </a:pPr>
+            <a:r>
+              <a:rPr kumimoji="0" lang="en-US" sz="3000" b="1" i="0" u="none" strike="noStrike" cap="none" spc="0" normalizeH="0" baseline="0" dirty="0" smtClean="0">
+                <a:ln>
+                  <a:noFill/>
+                </a:ln>
+                <a:solidFill>
+                  <a:srgbClr val="000000"/>
+                </a:solidFill>
+                <a:effectLst/>
+                <a:uFillTx/>
+                <a:latin typeface="Helvetica Neue"/>
+                <a:ea typeface="Helvetica Neue"/>
+                <a:cs typeface="Helvetica Neue"/>
+                <a:sym typeface="Helvetica Neue"/>
+              </a:rPr>
+              <a:t>Thi</a:t>
+            </a:r>
+            <a:r>
+              <a:rPr lang="en-US" dirty="0" smtClean="0"/>
+              <a:t>s slide left blank for whiteboard</a:t>
+            </a:r>
+            <a:endParaRPr kumimoji="0" lang="en-US" sz="3000" b="1" i="0" u="none" strike="noStrike" cap="none" spc="0" normalizeH="0" baseline="0" dirty="0">
+              <a:ln>
+                <a:noFill/>
+              </a:ln>
+              <a:solidFill>
+                <a:srgbClr val="000000"/>
+              </a:solidFill>
+              <a:effectLst/>
+              <a:uFillTx/>
+              <a:latin typeface="Helvetica Neue"/>
+              <a:ea typeface="Helvetica Neue"/>
+              <a:cs typeface="Helvetica Neue"/>
+              <a:sym typeface="Helvetica Neue"/>
+            </a:endParaRPr>
+          </a:p>
+        </p:txBody>
+      </p:sp>
+    </p:spTree>
+    <p:extLst>
+      <p:ext uri="{BB962C8B-B14F-4D97-AF65-F5344CB8AC3E}">
+        <p14:creationId xmlns:p14="http://schemas.microsoft.com/office/powerpoint/2010/main" val="2476088095"/>
+      </p:ext>
+    </p:extLst>
+  </p:cSld>
+  <p:clrMapOvr>
+    <a:masterClrMapping/>
+  </p:clrMapOvr>
+  <p:transition xmlns:p14="http://schemas.microsoft.com/office/powerpoint/2010/main" spd="med"/>
+</p:sld>
+</file>
+
+<file path=ppt/slides/slide4.xml><?xml version="1.0" encoding="utf-8"?>
+<p:sld xmlns:a="http://schemas.openxmlformats.org/drawingml/2006/main" xmlns:r="http://schemas.openxmlformats.org/officeDocument/2006/relationships" xmlns:p="http://schemas.openxmlformats.org/presentationml/2006/main">
+  <p:cSld>
+    <p:spTree>
+      <p:nvGrpSpPr>
+        <p:cNvPr id="1" name=""/>
+        <p:cNvGrpSpPr/>
+        <p:nvPr/>
+      </p:nvGrpSpPr>
+      <p:grpSpPr>
+        <a:xfrm>
+          <a:off x="0" y="0"/>
+          <a:ext cx="0" cy="0"/>
+          <a:chOff x="0" y="0"/>
+          <a:chExt cx="0" cy="0"/>
+        </a:xfrm>
+      </p:grpSpPr>
+      <p:sp>
+        <p:nvSpPr>
+          <p:cNvPr id="6" name="TextBox 5"/>
+          <p:cNvSpPr txBox="1"/>
+          <p:nvPr/>
+        </p:nvSpPr>
+        <p:spPr>
+          <a:xfrm>
+            <a:off x="6237111" y="12728316"/>
+            <a:ext cx="13095111" cy="564257"/>
+          </a:xfrm>
+          <a:prstGeom prst="rect">
+            <a:avLst/>
+          </a:prstGeom>
+          <a:noFill/>
+          <a:ln w="12700" cap="flat">
+            <a:noFill/>
+            <a:miter lim="400000"/>
+          </a:ln>
+          <a:effectLst/>
+          <a:sp3d/>
+        </p:spPr>
+        <p:style>
+          <a:lnRef idx="0">
+            <a:scrgbClr r="0" g="0" b="0"/>
+          </a:lnRef>
+          <a:fillRef idx="0">
+            <a:scrgbClr r="0" g="0" b="0"/>
+          </a:fillRef>
+          <a:effectRef idx="0">
+            <a:scrgbClr r="0" g="0" b="0"/>
+          </a:effectRef>
+          <a:fontRef idx="none"/>
+        </p:style>
+        <p:txBody>
+          <a:bodyPr rot="0" spcFirstLastPara="1" vertOverflow="overflow" horzOverflow="overflow" vert="horz" wrap="square" lIns="50800" tIns="50800" rIns="50800" bIns="50800" numCol="1" spcCol="38100" rtlCol="0" anchor="ctr">
+            <a:spAutoFit/>
+          </a:bodyPr>
+          <a:lstStyle/>
+          <a:p>
+            <a:pPr marL="0" marR="0" indent="0" algn="ctr" defTabSz="825500" rtl="0" fontAlgn="auto" latinLnBrk="0" hangingPunct="0">
+              <a:lnSpc>
+                <a:spcPct val="100000"/>
+              </a:lnSpc>
+              <a:spcBef>
+                <a:spcPts val="0"/>
+              </a:spcBef>
+              <a:spcAft>
+                <a:spcPts val="0"/>
+              </a:spcAft>
+              <a:buClrTx/>
+              <a:buSzTx/>
+              <a:buFontTx/>
+              <a:buNone/>
+              <a:tabLst/>
+            </a:pPr>
+            <a:r>
+              <a:rPr kumimoji="0" lang="en-US" sz="3000" b="1" i="0" u="none" strike="noStrike" cap="none" spc="0" normalizeH="0" baseline="0" dirty="0" smtClean="0">
+                <a:ln>
+                  <a:noFill/>
+                </a:ln>
+                <a:solidFill>
+                  <a:srgbClr val="000000"/>
+                </a:solidFill>
+                <a:effectLst/>
+                <a:uFillTx/>
+                <a:latin typeface="Helvetica Neue"/>
+                <a:ea typeface="Helvetica Neue"/>
+                <a:cs typeface="Helvetica Neue"/>
+                <a:sym typeface="Helvetica Neue"/>
+              </a:rPr>
+              <a:t>Thi</a:t>
+            </a:r>
+            <a:r>
+              <a:rPr lang="en-US" dirty="0" smtClean="0"/>
+              <a:t>s slide left blank for whiteboard</a:t>
+            </a:r>
+            <a:endParaRPr kumimoji="0" lang="en-US" sz="3000" b="1" i="0" u="none" strike="noStrike" cap="none" spc="0" normalizeH="0" baseline="0" dirty="0">
+              <a:ln>
+                <a:noFill/>
+              </a:ln>
+              <a:solidFill>
+                <a:srgbClr val="000000"/>
+              </a:solidFill>
+              <a:effectLst/>
+              <a:uFillTx/>
+              <a:latin typeface="Helvetica Neue"/>
+              <a:ea typeface="Helvetica Neue"/>
+              <a:cs typeface="Helvetica Neue"/>
+              <a:sym typeface="Helvetica Neue"/>
+            </a:endParaRPr>
+          </a:p>
+        </p:txBody>
+      </p:sp>
+    </p:spTree>
+    <p:extLst>
+      <p:ext uri="{BB962C8B-B14F-4D97-AF65-F5344CB8AC3E}">
+        <p14:creationId xmlns:p14="http://schemas.microsoft.com/office/powerpoint/2010/main" val="2476088095"/>
+      </p:ext>
+    </p:extLst>
+  </p:cSld>
+  <p:clrMapOvr>
+    <a:masterClrMapping/>
+  </p:clrMapOvr>
+  <p:transition xmlns:p14="http://schemas.microsoft.com/office/powerpoint/2010/main" spd="med"/>
+</p:sld>
+</file>
+
+<file path=ppt/slides/slide5.xml><?xml version="1.0" encoding="utf-8"?>
+<p:sld xmlns:a="http://schemas.openxmlformats.org/drawingml/2006/main" xmlns:r="http://schemas.openxmlformats.org/officeDocument/2006/relationships" xmlns:p="http://schemas.openxmlformats.org/presentationml/2006/main">
+  <p:cSld>
+    <p:spTree>
+      <p:nvGrpSpPr>
+        <p:cNvPr id="1" name=""/>
+        <p:cNvGrpSpPr/>
+        <p:nvPr/>
+      </p:nvGrpSpPr>
+      <p:grpSpPr>
+        <a:xfrm>
+          <a:off x="0" y="0"/>
+          <a:ext cx="0" cy="0"/>
+          <a:chOff x="0" y="0"/>
+          <a:chExt cx="0" cy="0"/>
+        </a:xfrm>
+      </p:grpSpPr>
+      <p:sp>
+        <p:nvSpPr>
+          <p:cNvPr id="6" name="TextBox 5"/>
+          <p:cNvSpPr txBox="1"/>
+          <p:nvPr/>
+        </p:nvSpPr>
+        <p:spPr>
+          <a:xfrm>
+            <a:off x="6237111" y="12728316"/>
+            <a:ext cx="13095111" cy="564257"/>
+          </a:xfrm>
+          <a:prstGeom prst="rect">
+            <a:avLst/>
+          </a:prstGeom>
+          <a:noFill/>
+          <a:ln w="12700" cap="flat">
+            <a:noFill/>
+            <a:miter lim="400000"/>
+          </a:ln>
+          <a:effectLst/>
+          <a:sp3d/>
+        </p:spPr>
+        <p:style>
+          <a:lnRef idx="0">
+            <a:scrgbClr r="0" g="0" b="0"/>
+          </a:lnRef>
+          <a:fillRef idx="0">
+            <a:scrgbClr r="0" g="0" b="0"/>
+          </a:fillRef>
+          <a:effectRef idx="0">
+            <a:scrgbClr r="0" g="0" b="0"/>
+          </a:effectRef>
+          <a:fontRef idx="none"/>
+        </p:style>
+        <p:txBody>
+          <a:bodyPr rot="0" spcFirstLastPara="1" vertOverflow="overflow" horzOverflow="overflow" vert="horz" wrap="square" lIns="50800" tIns="50800" rIns="50800" bIns="50800" numCol="1" spcCol="38100" rtlCol="0" anchor="ctr">
+            <a:spAutoFit/>
+          </a:bodyPr>
+          <a:lstStyle/>
+          <a:p>
+            <a:pPr marL="0" marR="0" indent="0" algn="ctr" defTabSz="825500" rtl="0" fontAlgn="auto" latinLnBrk="0" hangingPunct="0">
+              <a:lnSpc>
+                <a:spcPct val="100000"/>
+              </a:lnSpc>
+              <a:spcBef>
+                <a:spcPts val="0"/>
+              </a:spcBef>
+              <a:spcAft>
+                <a:spcPts val="0"/>
+              </a:spcAft>
+              <a:buClrTx/>
+              <a:buSzTx/>
+              <a:buFontTx/>
+              <a:buNone/>
+              <a:tabLst/>
+            </a:pPr>
+            <a:r>
+              <a:rPr kumimoji="0" lang="en-US" sz="3000" b="1" i="0" u="none" strike="noStrike" cap="none" spc="0" normalizeH="0" baseline="0" dirty="0" smtClean="0">
+                <a:ln>
+                  <a:noFill/>
+                </a:ln>
+                <a:solidFill>
+                  <a:srgbClr val="000000"/>
+                </a:solidFill>
+                <a:effectLst/>
+                <a:uFillTx/>
+                <a:latin typeface="Helvetica Neue"/>
+                <a:ea typeface="Helvetica Neue"/>
+                <a:cs typeface="Helvetica Neue"/>
+                <a:sym typeface="Helvetica Neue"/>
+              </a:rPr>
+              <a:t>Thi</a:t>
+            </a:r>
+            <a:r>
+              <a:rPr lang="en-US" dirty="0" smtClean="0"/>
+              <a:t>s slide left blank for whiteboard</a:t>
+            </a:r>
+            <a:endParaRPr kumimoji="0" lang="en-US" sz="3000" b="1" i="0" u="none" strike="noStrike" cap="none" spc="0" normalizeH="0" baseline="0" dirty="0">
+              <a:ln>
+                <a:noFill/>
+              </a:ln>
+              <a:solidFill>
+                <a:srgbClr val="000000"/>
+              </a:solidFill>
+              <a:effectLst/>
+              <a:uFillTx/>
+              <a:latin typeface="Helvetica Neue"/>
+              <a:ea typeface="Helvetica Neue"/>
+              <a:cs typeface="Helvetica Neue"/>
+              <a:sym typeface="Helvetica Neue"/>
+            </a:endParaRPr>
+          </a:p>
+        </p:txBody>
+      </p:sp>
+    </p:spTree>
+    <p:extLst>
+      <p:ext uri="{BB962C8B-B14F-4D97-AF65-F5344CB8AC3E}">
+        <p14:creationId xmlns:p14="http://schemas.microsoft.com/office/powerpoint/2010/main" val="2476088095"/>
+      </p:ext>
+    </p:extLst>
+  </p:cSld>
+  <p:clrMapOvr>
+    <a:masterClrMapping/>
+  </p:clrMapOvr>
+  <p:transition xmlns:p14="http://schemas.microsoft.com/office/powerpoint/2010/main" spd="med"/>
+</p:sld>
+</file>
+
+<file path=ppt/slides/slide6.xml><?xml version="1.0" encoding="utf-8"?>
+<p:sld xmlns:a="http://schemas.openxmlformats.org/drawingml/2006/main" xmlns:r="http://schemas.openxmlformats.org/officeDocument/2006/relationships" xmlns:p="http://schemas.openxmlformats.org/presentationml/2006/main">
+  <p:cSld>
+    <p:spTree>
+      <p:nvGrpSpPr>
+        <p:cNvPr id="1" name=""/>
+        <p:cNvGrpSpPr/>
+        <p:nvPr/>
+      </p:nvGrpSpPr>
+      <p:grpSpPr>
+        <a:xfrm>
+          <a:off x="0" y="0"/>
+          <a:ext cx="0" cy="0"/>
+          <a:chOff x="0" y="0"/>
+          <a:chExt cx="0" cy="0"/>
+        </a:xfrm>
+      </p:grpSpPr>
+      <p:sp>
+        <p:nvSpPr>
+          <p:cNvPr id="6" name="TextBox 5"/>
+          <p:cNvSpPr txBox="1"/>
+          <p:nvPr/>
+        </p:nvSpPr>
+        <p:spPr>
+          <a:xfrm>
+            <a:off x="6237111" y="12728316"/>
+            <a:ext cx="13095111" cy="564257"/>
+          </a:xfrm>
+          <a:prstGeom prst="rect">
+            <a:avLst/>
+          </a:prstGeom>
+          <a:noFill/>
+          <a:ln w="12700" cap="flat">
+            <a:noFill/>
+            <a:miter lim="400000"/>
+          </a:ln>
+          <a:effectLst/>
+          <a:sp3d/>
+        </p:spPr>
+        <p:style>
+          <a:lnRef idx="0">
+            <a:scrgbClr r="0" g="0" b="0"/>
+          </a:lnRef>
+          <a:fillRef idx="0">
+            <a:scrgbClr r="0" g="0" b="0"/>
+          </a:fillRef>
+          <a:effectRef idx="0">
+            <a:scrgbClr r="0" g="0" b="0"/>
+          </a:effectRef>
+          <a:fontRef idx="none"/>
+        </p:style>
+        <p:txBody>
+          <a:bodyPr rot="0" spcFirstLastPara="1" vertOverflow="overflow" horzOverflow="overflow" vert="horz" wrap="square" lIns="50800" tIns="50800" rIns="50800" bIns="50800" numCol="1" spcCol="38100" rtlCol="0" anchor="ctr">
+            <a:spAutoFit/>
+          </a:bodyPr>
+          <a:lstStyle/>
+          <a:p>
+            <a:pPr marL="0" marR="0" indent="0" algn="ctr" defTabSz="825500" rtl="0" fontAlgn="auto" latinLnBrk="0" hangingPunct="0">
+              <a:lnSpc>
+                <a:spcPct val="100000"/>
+              </a:lnSpc>
+              <a:spcBef>
+                <a:spcPts val="0"/>
+              </a:spcBef>
+              <a:spcAft>
+                <a:spcPts val="0"/>
+              </a:spcAft>
+              <a:buClrTx/>
+              <a:buSzTx/>
+              <a:buFontTx/>
+              <a:buNone/>
+              <a:tabLst/>
+            </a:pPr>
+            <a:r>
+              <a:rPr kumimoji="0" lang="en-US" sz="3000" b="1" i="0" u="none" strike="noStrike" cap="none" spc="0" normalizeH="0" baseline="0" dirty="0" smtClean="0">
+                <a:ln>
+                  <a:noFill/>
+                </a:ln>
+                <a:solidFill>
+                  <a:srgbClr val="000000"/>
+                </a:solidFill>
+                <a:effectLst/>
+                <a:uFillTx/>
+                <a:latin typeface="Helvetica Neue"/>
+                <a:ea typeface="Helvetica Neue"/>
+                <a:cs typeface="Helvetica Neue"/>
+                <a:sym typeface="Helvetica Neue"/>
+              </a:rPr>
+              <a:t>Thi</a:t>
+            </a:r>
+            <a:r>
+              <a:rPr lang="en-US" dirty="0" smtClean="0"/>
+              <a:t>s slide left blank for whiteboard</a:t>
+            </a:r>
+            <a:endParaRPr kumimoji="0" lang="en-US" sz="3000" b="1" i="0" u="none" strike="noStrike" cap="none" spc="0" normalizeH="0" baseline="0" dirty="0">
+              <a:ln>
+                <a:noFill/>
+              </a:ln>
+              <a:solidFill>
+                <a:srgbClr val="000000"/>
+              </a:solidFill>
+              <a:effectLst/>
+              <a:uFillTx/>
+              <a:latin typeface="Helvetica Neue"/>
+              <a:ea typeface="Helvetica Neue"/>
+              <a:cs typeface="Helvetica Neue"/>
+              <a:sym typeface="Helvetica Neue"/>
+            </a:endParaRPr>
+          </a:p>
+        </p:txBody>
+      </p:sp>
+    </p:spTree>
+    <p:extLst>
+      <p:ext uri="{BB962C8B-B14F-4D97-AF65-F5344CB8AC3E}">
+        <p14:creationId xmlns:p14="http://schemas.microsoft.com/office/powerpoint/2010/main" val="2476088095"/>
+      </p:ext>
+    </p:extLst>
+  </p:cSld>
+  <p:clrMapOvr>
+    <a:masterClrMapping/>
+  </p:clrMapOvr>
+  <p:transition xmlns:p14="http://schemas.microsoft.com/office/powerpoint/2010/main" spd="med"/>
+</p:sld>
+</file>
+
 <file path=ppt/theme/theme1.xml><?xml version="1.0" encoding="utf-8"?>
 <a:theme xmlns:a="http://schemas.openxmlformats.org/drawingml/2006/main" name="White">
   <a:themeElements>

</xml_diff>

<commit_message>
Add more blank slides to default presentation
</commit_message>
<xml_diff>
--- a/bigbluebutton-config/web/default.pptx
+++ b/bigbluebutton-config/web/default.pptx
@@ -5,15 +5,29 @@
     <p:sldMasterId id="2147483648" r:id="rId1"/>
   </p:sldMasterIdLst>
   <p:notesMasterIdLst>
-    <p:notesMasterId r:id="rId8"/>
+    <p:notesMasterId r:id="rId22"/>
   </p:notesMasterIdLst>
   <p:sldIdLst>
     <p:sldId id="256" r:id="rId2"/>
     <p:sldId id="257" r:id="rId3"/>
     <p:sldId id="258" r:id="rId4"/>
     <p:sldId id="259" r:id="rId5"/>
-    <p:sldId id="260" r:id="rId6"/>
-    <p:sldId id="261" r:id="rId7"/>
+    <p:sldId id="261" r:id="rId6"/>
+    <p:sldId id="260" r:id="rId7"/>
+    <p:sldId id="262" r:id="rId8"/>
+    <p:sldId id="263" r:id="rId9"/>
+    <p:sldId id="264" r:id="rId10"/>
+    <p:sldId id="265" r:id="rId11"/>
+    <p:sldId id="266" r:id="rId12"/>
+    <p:sldId id="267" r:id="rId13"/>
+    <p:sldId id="268" r:id="rId14"/>
+    <p:sldId id="269" r:id="rId15"/>
+    <p:sldId id="270" r:id="rId16"/>
+    <p:sldId id="271" r:id="rId17"/>
+    <p:sldId id="272" r:id="rId18"/>
+    <p:sldId id="273" r:id="rId19"/>
+    <p:sldId id="274" r:id="rId20"/>
+    <p:sldId id="275" r:id="rId21"/>
   </p:sldIdLst>
   <p:sldSz cx="24384000" cy="13716000"/>
   <p:notesSz cx="6858000" cy="9144000"/>
@@ -315,6 +329,22 @@
       </a:defRPr>
     </a:lvl9pPr>
   </p:defaultTextStyle>
+  <p:extLst>
+    <p:ext uri="{EFAFB233-063F-42B5-8137-9DF3F51BA10A}">
+      <p15:sldGuideLst xmlns:p15="http://schemas.microsoft.com/office/powerpoint/2012/main">
+        <p15:guide id="1" orient="horz" pos="4320">
+          <p15:clr>
+            <a:srgbClr val="A4A3A4"/>
+          </p15:clr>
+        </p15:guide>
+        <p15:guide id="2" pos="7680">
+          <p15:clr>
+            <a:srgbClr val="A4A3A4"/>
+          </p15:clr>
+        </p15:guide>
+      </p15:sldGuideLst>
+    </p:ext>
+  </p:extLst>
 </p:presentation>
 </file>
 
@@ -677,7 +707,7 @@
   <p:clrMapOvr>
     <a:masterClrMapping/>
   </p:clrMapOvr>
-  <p:transition xmlns:p14="http://schemas.microsoft.com/office/powerpoint/2010/main" spd="med"/>
+  <p:transition spd="med"/>
 </p:sldLayout>
 </file>
 
@@ -814,7 +844,7 @@
   <p:clrMapOvr>
     <a:masterClrMapping/>
   </p:clrMapOvr>
-  <p:transition xmlns:p14="http://schemas.microsoft.com/office/powerpoint/2010/main" spd="med"/>
+  <p:transition spd="med"/>
 </p:sldLayout>
 </file>
 
@@ -895,7 +925,7 @@
   <p:clrMapOvr>
     <a:masterClrMapping/>
   </p:clrMapOvr>
-  <p:transition xmlns:p14="http://schemas.microsoft.com/office/powerpoint/2010/main" spd="med"/>
+  <p:transition spd="med"/>
 </p:sldLayout>
 </file>
 
@@ -947,7 +977,7 @@
   <p:clrMapOvr>
     <a:masterClrMapping/>
   </p:clrMapOvr>
-  <p:transition xmlns:p14="http://schemas.microsoft.com/office/powerpoint/2010/main" spd="med"/>
+  <p:transition spd="med"/>
 </p:sldLayout>
 </file>
 
@@ -1151,7 +1181,7 @@
   <p:clrMapOvr>
     <a:masterClrMapping/>
   </p:clrMapOvr>
-  <p:transition xmlns:p14="http://schemas.microsoft.com/office/powerpoint/2010/main" spd="med"/>
+  <p:transition spd="med"/>
 </p:sldLayout>
 </file>
 
@@ -1232,7 +1262,7 @@
   <p:clrMapOvr>
     <a:masterClrMapping/>
   </p:clrMapOvr>
-  <p:transition xmlns:p14="http://schemas.microsoft.com/office/powerpoint/2010/main" spd="med"/>
+  <p:transition spd="med"/>
 </p:sldLayout>
 </file>
 
@@ -1440,7 +1470,7 @@
   <p:clrMapOvr>
     <a:masterClrMapping/>
   </p:clrMapOvr>
-  <p:transition xmlns:p14="http://schemas.microsoft.com/office/powerpoint/2010/main" spd="med"/>
+  <p:transition spd="med"/>
 </p:sldLayout>
 </file>
 
@@ -1517,7 +1547,7 @@
   <p:clrMapOvr>
     <a:masterClrMapping/>
   </p:clrMapOvr>
-  <p:transition xmlns:p14="http://schemas.microsoft.com/office/powerpoint/2010/main" spd="med"/>
+  <p:transition spd="med"/>
 </p:sldLayout>
 </file>
 
@@ -1659,7 +1689,7 @@
   <p:clrMapOvr>
     <a:masterClrMapping/>
   </p:clrMapOvr>
-  <p:transition xmlns:p14="http://schemas.microsoft.com/office/powerpoint/2010/main" spd="med"/>
+  <p:transition spd="med"/>
 </p:sldLayout>
 </file>
 
@@ -1849,7 +1879,7 @@
   <p:clrMapOvr>
     <a:masterClrMapping/>
   </p:clrMapOvr>
-  <p:transition xmlns:p14="http://schemas.microsoft.com/office/powerpoint/2010/main" spd="med"/>
+  <p:transition spd="med"/>
 </p:sldLayout>
 </file>
 
@@ -1970,7 +2000,7 @@
   <p:clrMapOvr>
     <a:masterClrMapping/>
   </p:clrMapOvr>
-  <p:transition xmlns:p14="http://schemas.microsoft.com/office/powerpoint/2010/main" spd="med"/>
+  <p:transition spd="med"/>
 </p:sldLayout>
 </file>
 
@@ -2109,7 +2139,7 @@
   <p:clrMapOvr>
     <a:masterClrMapping/>
   </p:clrMapOvr>
-  <p:transition xmlns:p14="http://schemas.microsoft.com/office/powerpoint/2010/main" spd="med"/>
+  <p:transition spd="med"/>
 </p:sldLayout>
 </file>
 
@@ -2161,7 +2191,7 @@
           </a:ln>
           <a:extLst>
             <a:ext uri="{C572A759-6A51-4108-AA02-DFA0A04FC94B}">
-              <ma14:wrappingTextBoxFlag xmlns:ma14="http://schemas.microsoft.com/office/mac/drawingml/2011/main" val="1"/>
+              <ma14:wrappingTextBoxFlag xmlns:ma14="http://schemas.microsoft.com/office/mac/drawingml/2011/main" xmlns="" val="1"/>
             </a:ext>
           </a:extLst>
         </p:spPr>
@@ -2200,7 +2230,7 @@
           </a:ln>
           <a:extLst>
             <a:ext uri="{C572A759-6A51-4108-AA02-DFA0A04FC94B}">
-              <ma14:wrappingTextBoxFlag xmlns:ma14="http://schemas.microsoft.com/office/mac/drawingml/2011/main" val="1"/>
+              <ma14:wrappingTextBoxFlag xmlns:ma14="http://schemas.microsoft.com/office/mac/drawingml/2011/main" xmlns="" val="1"/>
             </a:ext>
           </a:extLst>
         </p:spPr>
@@ -2301,7 +2331,7 @@
     <p:sldLayoutId id="2147483659" r:id="rId11"/>
     <p:sldLayoutId id="2147483660" r:id="rId12"/>
   </p:sldLayoutIdLst>
-  <p:transition xmlns:p14="http://schemas.microsoft.com/office/powerpoint/2010/main" spd="med"/>
+  <p:transition spd="med"/>
   <p:txStyles>
     <p:titleStyle>
       <a:lvl1pPr marL="0" marR="0" indent="0" algn="ctr" defTabSz="825500" rtl="0" latinLnBrk="0">
@@ -3174,7 +3204,7 @@
           </a:ln>
           <a:extLst>
             <a:ext uri="{C572A759-6A51-4108-AA02-DFA0A04FC94B}">
-              <ma14:wrappingTextBoxFlag xmlns:ma14="http://schemas.microsoft.com/office/mac/drawingml/2011/main" val="1"/>
+              <ma14:wrappingTextBoxFlag xmlns:ma14="http://schemas.microsoft.com/office/mac/drawingml/2011/main" xmlns="" val="1"/>
             </a:ext>
           </a:extLst>
         </p:spPr>
@@ -3261,7 +3291,7 @@
           </a:ln>
           <a:extLst>
             <a:ext uri="{C572A759-6A51-4108-AA02-DFA0A04FC94B}">
-              <ma14:wrappingTextBoxFlag xmlns:ma14="http://schemas.microsoft.com/office/mac/drawingml/2011/main" val="1"/>
+              <ma14:wrappingTextBoxFlag xmlns:ma14="http://schemas.microsoft.com/office/mac/drawingml/2011/main" xmlns="" val="1"/>
             </a:ext>
           </a:extLst>
         </p:spPr>
@@ -3284,6 +3314,7 @@
           </a:lstStyle>
           <a:p>
             <a:r>
+              <a:rPr dirty="0"/>
               <a:t>BigBlueButton is an open source web conferencing system designed for online learning</a:t>
             </a:r>
           </a:p>
@@ -3318,7 +3349,7 @@
           </a:effectLst>
           <a:extLst>
             <a:ext uri="{C572A759-6A51-4108-AA02-DFA0A04FC94B}">
-              <ma14:wrappingTextBoxFlag xmlns:ma14="http://schemas.microsoft.com/office/mac/drawingml/2011/main" val="1"/>
+              <ma14:wrappingTextBoxFlag xmlns:ma14="http://schemas.microsoft.com/office/mac/drawingml/2011/main" xmlns="" val="1"/>
             </a:ext>
           </a:extLst>
         </p:spPr>
@@ -3363,7 +3394,7 @@
           </a:ln>
           <a:extLst>
             <a:ext uri="{C572A759-6A51-4108-AA02-DFA0A04FC94B}">
-              <ma14:wrappingTextBoxFlag xmlns:ma14="http://schemas.microsoft.com/office/mac/drawingml/2011/main" val="1"/>
+              <ma14:wrappingTextBoxFlag xmlns:ma14="http://schemas.microsoft.com/office/mac/drawingml/2011/main" xmlns="" val="1"/>
             </a:ext>
           </a:extLst>
         </p:spPr>
@@ -3386,7 +3417,7 @@
           </a:lstStyle>
           <a:p>
             <a:r>
-              <a:rPr lang="en-US" dirty="0" smtClean="0"/>
+              <a:rPr lang="en-US" dirty="0"/>
               <a:t>Chat</a:t>
             </a:r>
             <a:endParaRPr dirty="0"/>
@@ -3412,7 +3443,7 @@
           </a:ln>
           <a:extLst>
             <a:ext uri="{C572A759-6A51-4108-AA02-DFA0A04FC94B}">
-              <ma14:wrappingTextBoxFlag xmlns:ma14="http://schemas.microsoft.com/office/mac/drawingml/2011/main" val="1"/>
+              <ma14:wrappingTextBoxFlag xmlns:ma14="http://schemas.microsoft.com/office/mac/drawingml/2011/main" xmlns="" val="1"/>
             </a:ext>
           </a:extLst>
         </p:spPr>
@@ -3500,7 +3531,7 @@
           </a:ln>
           <a:extLst>
             <a:ext uri="{C572A759-6A51-4108-AA02-DFA0A04FC94B}">
-              <ma14:wrappingTextBoxFlag xmlns:ma14="http://schemas.microsoft.com/office/mac/drawingml/2011/main" val="1"/>
+              <ma14:wrappingTextBoxFlag xmlns:ma14="http://schemas.microsoft.com/office/mac/drawingml/2011/main" xmlns="" val="1"/>
             </a:ext>
           </a:extLst>
         </p:spPr>
@@ -3523,10 +3554,9 @@
           </a:lstStyle>
           <a:p>
             <a:r>
-              <a:rPr dirty="0" smtClean="0"/>
+              <a:rPr dirty="0"/>
               <a:t>Webcams</a:t>
             </a:r>
-            <a:endParaRPr dirty="0"/>
           </a:p>
         </p:txBody>
       </p:sp>
@@ -3549,7 +3579,7 @@
           </a:ln>
           <a:extLst>
             <a:ext uri="{C572A759-6A51-4108-AA02-DFA0A04FC94B}">
-              <ma14:wrappingTextBoxFlag xmlns:ma14="http://schemas.microsoft.com/office/mac/drawingml/2011/main" val="1"/>
+              <ma14:wrappingTextBoxFlag xmlns:ma14="http://schemas.microsoft.com/office/mac/drawingml/2011/main" xmlns="" val="1"/>
             </a:ext>
           </a:extLst>
         </p:spPr>
@@ -3637,7 +3667,7 @@
           </a:ln>
           <a:extLst>
             <a:ext uri="{C572A759-6A51-4108-AA02-DFA0A04FC94B}">
-              <ma14:wrappingTextBoxFlag xmlns:ma14="http://schemas.microsoft.com/office/mac/drawingml/2011/main" val="1"/>
+              <ma14:wrappingTextBoxFlag xmlns:ma14="http://schemas.microsoft.com/office/mac/drawingml/2011/main" xmlns="" val="1"/>
             </a:ext>
           </a:extLst>
         </p:spPr>
@@ -3660,10 +3690,9 @@
           </a:lstStyle>
           <a:p>
             <a:r>
-              <a:rPr dirty="0" smtClean="0"/>
+              <a:rPr dirty="0"/>
               <a:t>Audio</a:t>
             </a:r>
-            <a:endParaRPr dirty="0"/>
           </a:p>
         </p:txBody>
       </p:sp>
@@ -3686,7 +3715,7 @@
           </a:ln>
           <a:extLst>
             <a:ext uri="{C572A759-6A51-4108-AA02-DFA0A04FC94B}">
-              <ma14:wrappingTextBoxFlag xmlns:ma14="http://schemas.microsoft.com/office/mac/drawingml/2011/main" val="1"/>
+              <ma14:wrappingTextBoxFlag xmlns:ma14="http://schemas.microsoft.com/office/mac/drawingml/2011/main" xmlns="" val="1"/>
             </a:ext>
           </a:extLst>
         </p:spPr>
@@ -3775,7 +3804,7 @@
           </a:ln>
           <a:extLst>
             <a:ext uri="{C572A759-6A51-4108-AA02-DFA0A04FC94B}">
-              <ma14:wrappingTextBoxFlag xmlns:ma14="http://schemas.microsoft.com/office/mac/drawingml/2011/main" val="1"/>
+              <ma14:wrappingTextBoxFlag xmlns:ma14="http://schemas.microsoft.com/office/mac/drawingml/2011/main" xmlns="" val="1"/>
             </a:ext>
           </a:extLst>
         </p:spPr>
@@ -3822,7 +3851,7 @@
           </a:ln>
           <a:extLst>
             <a:ext uri="{C572A759-6A51-4108-AA02-DFA0A04FC94B}">
-              <ma14:wrappingTextBoxFlag xmlns:ma14="http://schemas.microsoft.com/office/mac/drawingml/2011/main" val="1"/>
+              <ma14:wrappingTextBoxFlag xmlns:ma14="http://schemas.microsoft.com/office/mac/drawingml/2011/main" xmlns="" val="1"/>
             </a:ext>
           </a:extLst>
         </p:spPr>
@@ -3910,7 +3939,7 @@
           </a:ln>
           <a:extLst>
             <a:ext uri="{C572A759-6A51-4108-AA02-DFA0A04FC94B}">
-              <ma14:wrappingTextBoxFlag xmlns:ma14="http://schemas.microsoft.com/office/mac/drawingml/2011/main" val="1"/>
+              <ma14:wrappingTextBoxFlag xmlns:ma14="http://schemas.microsoft.com/office/mac/drawingml/2011/main" xmlns="" val="1"/>
             </a:ext>
           </a:extLst>
         </p:spPr>
@@ -3957,7 +3986,7 @@
           </a:ln>
           <a:extLst>
             <a:ext uri="{C572A759-6A51-4108-AA02-DFA0A04FC94B}">
-              <ma14:wrappingTextBoxFlag xmlns:ma14="http://schemas.microsoft.com/office/mac/drawingml/2011/main" val="1"/>
+              <ma14:wrappingTextBoxFlag xmlns:ma14="http://schemas.microsoft.com/office/mac/drawingml/2011/main" xmlns="" val="1"/>
             </a:ext>
           </a:extLst>
         </p:spPr>
@@ -4045,7 +4074,7 @@
           </a:ln>
           <a:extLst>
             <a:ext uri="{C572A759-6A51-4108-AA02-DFA0A04FC94B}">
-              <ma14:wrappingTextBoxFlag xmlns:ma14="http://schemas.microsoft.com/office/mac/drawingml/2011/main" val="1"/>
+              <ma14:wrappingTextBoxFlag xmlns:ma14="http://schemas.microsoft.com/office/mac/drawingml/2011/main" xmlns="" val="1"/>
             </a:ext>
           </a:extLst>
         </p:spPr>
@@ -4092,7 +4121,7 @@
           </a:ln>
           <a:extLst>
             <a:ext uri="{C572A759-6A51-4108-AA02-DFA0A04FC94B}">
-              <ma14:wrappingTextBoxFlag xmlns:ma14="http://schemas.microsoft.com/office/mac/drawingml/2011/main" val="1"/>
+              <ma14:wrappingTextBoxFlag xmlns:ma14="http://schemas.microsoft.com/office/mac/drawingml/2011/main" xmlns="" val="1"/>
             </a:ext>
           </a:extLst>
         </p:spPr>
@@ -4180,7 +4209,7 @@
           </a:ln>
           <a:extLst>
             <a:ext uri="{C572A759-6A51-4108-AA02-DFA0A04FC94B}">
-              <ma14:wrappingTextBoxFlag xmlns:ma14="http://schemas.microsoft.com/office/mac/drawingml/2011/main" val="1"/>
+              <ma14:wrappingTextBoxFlag xmlns:ma14="http://schemas.microsoft.com/office/mac/drawingml/2011/main" xmlns="" val="1"/>
             </a:ext>
           </a:extLst>
         </p:spPr>
@@ -4203,18 +4232,17 @@
           </a:lstStyle>
           <a:p>
             <a:r>
-              <a:rPr dirty="0" smtClean="0"/>
+              <a:rPr dirty="0"/>
               <a:t>Screen</a:t>
             </a:r>
             <a:r>
-              <a:rPr lang="en-US" dirty="0" smtClean="0"/>
+              <a:rPr lang="en-US" dirty="0"/>
               <a:t> </a:t>
             </a:r>
             <a:r>
-              <a:rPr dirty="0" smtClean="0"/>
+              <a:rPr dirty="0"/>
               <a:t>sharing</a:t>
             </a:r>
-            <a:endParaRPr dirty="0"/>
           </a:p>
         </p:txBody>
       </p:sp>
@@ -4237,7 +4265,7 @@
           </a:ln>
           <a:extLst>
             <a:ext uri="{C572A759-6A51-4108-AA02-DFA0A04FC94B}">
-              <ma14:wrappingTextBoxFlag xmlns:ma14="http://schemas.microsoft.com/office/mac/drawingml/2011/main" val="1"/>
+              <ma14:wrappingTextBoxFlag xmlns:ma14="http://schemas.microsoft.com/office/mac/drawingml/2011/main" xmlns="" val="1"/>
             </a:ext>
           </a:extLst>
         </p:spPr>
@@ -4325,7 +4353,7 @@
           </a:ln>
           <a:extLst>
             <a:ext uri="{C572A759-6A51-4108-AA02-DFA0A04FC94B}">
-              <ma14:wrappingTextBoxFlag xmlns:ma14="http://schemas.microsoft.com/office/mac/drawingml/2011/main" val="1"/>
+              <ma14:wrappingTextBoxFlag xmlns:ma14="http://schemas.microsoft.com/office/mac/drawingml/2011/main" xmlns="" val="1"/>
             </a:ext>
           </a:extLst>
         </p:spPr>
@@ -4372,7 +4400,7 @@
           </a:ln>
           <a:extLst>
             <a:ext uri="{C572A759-6A51-4108-AA02-DFA0A04FC94B}">
-              <ma14:wrappingTextBoxFlag xmlns:ma14="http://schemas.microsoft.com/office/mac/drawingml/2011/main" val="1"/>
+              <ma14:wrappingTextBoxFlag xmlns:ma14="http://schemas.microsoft.com/office/mac/drawingml/2011/main" xmlns="" val="1"/>
             </a:ext>
           </a:extLst>
         </p:spPr>
@@ -4460,7 +4488,7 @@
           </a:ln>
           <a:extLst>
             <a:ext uri="{C572A759-6A51-4108-AA02-DFA0A04FC94B}">
-              <ma14:wrappingTextBoxFlag xmlns:ma14="http://schemas.microsoft.com/office/mac/drawingml/2011/main" val="1"/>
+              <ma14:wrappingTextBoxFlag xmlns:ma14="http://schemas.microsoft.com/office/mac/drawingml/2011/main" xmlns="" val="1"/>
             </a:ext>
           </a:extLst>
         </p:spPr>
@@ -4512,9 +4540,7 @@
           <p:nvPr/>
         </p:nvPicPr>
         <p:blipFill>
-          <a:blip r:embed="rId4">
-            <a:extLst/>
-          </a:blip>
+          <a:blip r:embed="rId4"/>
           <a:stretch>
             <a:fillRect/>
           </a:stretch>
@@ -4541,9 +4567,7 @@
           <p:nvPr/>
         </p:nvPicPr>
         <p:blipFill>
-          <a:blip r:embed="rId5">
-            <a:extLst/>
-          </a:blip>
+          <a:blip r:embed="rId5"/>
           <a:stretch>
             <a:fillRect/>
           </a:stretch>
@@ -4570,9 +4594,7 @@
           <p:nvPr/>
         </p:nvPicPr>
         <p:blipFill>
-          <a:blip r:embed="rId6">
-            <a:extLst/>
-          </a:blip>
+          <a:blip r:embed="rId6"/>
           <a:stretch>
             <a:fillRect/>
           </a:stretch>
@@ -4599,9 +4621,7 @@
           <p:nvPr/>
         </p:nvPicPr>
         <p:blipFill>
-          <a:blip r:embed="rId7">
-            <a:extLst/>
-          </a:blip>
+          <a:blip r:embed="rId7"/>
           <a:stretch>
             <a:fillRect/>
           </a:stretch>
@@ -4628,9 +4648,7 @@
           <p:nvPr/>
         </p:nvPicPr>
         <p:blipFill>
-          <a:blip r:embed="rId8">
-            <a:extLst/>
-          </a:blip>
+          <a:blip r:embed="rId8"/>
           <a:stretch>
             <a:fillRect/>
           </a:stretch>
@@ -4657,9 +4675,7 @@
           <p:nvPr/>
         </p:nvPicPr>
         <p:blipFill>
-          <a:blip r:embed="rId9">
-            <a:extLst/>
-          </a:blip>
+          <a:blip r:embed="rId9"/>
           <a:stretch>
             <a:fillRect/>
           </a:stretch>
@@ -4686,9 +4702,7 @@
           <p:nvPr/>
         </p:nvPicPr>
         <p:blipFill>
-          <a:blip r:embed="rId10">
-            <a:extLst/>
-          </a:blip>
+          <a:blip r:embed="rId10"/>
           <a:stretch>
             <a:fillRect/>
           </a:stretch>
@@ -4715,9 +4729,7 @@
           <p:nvPr/>
         </p:nvPicPr>
         <p:blipFill>
-          <a:blip r:embed="rId11">
-            <a:extLst/>
-          </a:blip>
+          <a:blip r:embed="rId11"/>
           <a:stretch>
             <a:fillRect/>
           </a:stretch>
@@ -4744,9 +4756,7 @@
           <p:nvPr/>
         </p:nvPicPr>
         <p:blipFill>
-          <a:blip r:embed="rId12">
-            <a:extLst/>
-          </a:blip>
+          <a:blip r:embed="rId12"/>
           <a:srcRect l="15" r="9" b="25"/>
           <a:stretch>
             <a:fillRect/>
@@ -5094,7 +5104,1257 @@
   <p:clrMapOvr>
     <a:masterClrMapping/>
   </p:clrMapOvr>
-  <p:transition xmlns:p14="http://schemas.microsoft.com/office/powerpoint/2010/main" spd="med"/>
+  <p:transition spd="med"/>
+</p:sld>
+</file>
+
+<file path=ppt/slides/slide10.xml><?xml version="1.0" encoding="utf-8"?>
+<p:sld xmlns:a="http://schemas.openxmlformats.org/drawingml/2006/main" xmlns:r="http://schemas.openxmlformats.org/officeDocument/2006/relationships" xmlns:p="http://schemas.openxmlformats.org/presentationml/2006/main">
+  <p:cSld>
+    <p:spTree>
+      <p:nvGrpSpPr>
+        <p:cNvPr id="1" name=""/>
+        <p:cNvGrpSpPr/>
+        <p:nvPr/>
+      </p:nvGrpSpPr>
+      <p:grpSpPr>
+        <a:xfrm>
+          <a:off x="0" y="0"/>
+          <a:ext cx="0" cy="0"/>
+          <a:chOff x="0" y="0"/>
+          <a:chExt cx="0" cy="0"/>
+        </a:xfrm>
+      </p:grpSpPr>
+      <p:sp>
+        <p:nvSpPr>
+          <p:cNvPr id="6" name="TextBox 5"/>
+          <p:cNvSpPr txBox="1"/>
+          <p:nvPr/>
+        </p:nvSpPr>
+        <p:spPr>
+          <a:xfrm>
+            <a:off x="6237111" y="12728316"/>
+            <a:ext cx="13095111" cy="564257"/>
+          </a:xfrm>
+          <a:prstGeom prst="rect">
+            <a:avLst/>
+          </a:prstGeom>
+          <a:noFill/>
+          <a:ln w="12700" cap="flat">
+            <a:noFill/>
+            <a:miter lim="400000"/>
+          </a:ln>
+          <a:effectLst/>
+          <a:sp3d/>
+        </p:spPr>
+        <p:style>
+          <a:lnRef idx="0">
+            <a:scrgbClr r="0" g="0" b="0"/>
+          </a:lnRef>
+          <a:fillRef idx="0">
+            <a:scrgbClr r="0" g="0" b="0"/>
+          </a:fillRef>
+          <a:effectRef idx="0">
+            <a:scrgbClr r="0" g="0" b="0"/>
+          </a:effectRef>
+          <a:fontRef idx="none"/>
+        </p:style>
+        <p:txBody>
+          <a:bodyPr rot="0" spcFirstLastPara="1" vertOverflow="overflow" horzOverflow="overflow" vert="horz" wrap="square" lIns="50800" tIns="50800" rIns="50800" bIns="50800" numCol="1" spcCol="38100" rtlCol="0" anchor="ctr">
+            <a:spAutoFit/>
+          </a:bodyPr>
+          <a:lstStyle/>
+          <a:p>
+            <a:pPr marL="0" marR="0" indent="0" algn="ctr" defTabSz="825500" rtl="0" fontAlgn="auto" latinLnBrk="0" hangingPunct="0">
+              <a:lnSpc>
+                <a:spcPct val="100000"/>
+              </a:lnSpc>
+              <a:spcBef>
+                <a:spcPts val="0"/>
+              </a:spcBef>
+              <a:spcAft>
+                <a:spcPts val="0"/>
+              </a:spcAft>
+              <a:buClrTx/>
+              <a:buSzTx/>
+              <a:buFontTx/>
+              <a:buNone/>
+              <a:tabLst/>
+            </a:pPr>
+            <a:r>
+              <a:rPr kumimoji="0" lang="en-US" sz="3000" b="1" i="0" u="none" strike="noStrike" cap="none" spc="0" normalizeH="0" baseline="0" dirty="0">
+                <a:ln>
+                  <a:noFill/>
+                </a:ln>
+                <a:solidFill>
+                  <a:srgbClr val="000000"/>
+                </a:solidFill>
+                <a:effectLst/>
+                <a:uFillTx/>
+                <a:latin typeface="Helvetica Neue"/>
+                <a:ea typeface="Helvetica Neue"/>
+                <a:cs typeface="Helvetica Neue"/>
+                <a:sym typeface="Helvetica Neue"/>
+              </a:rPr>
+              <a:t>Thi</a:t>
+            </a:r>
+            <a:r>
+              <a:rPr lang="en-US" dirty="0"/>
+              <a:t>s slide left blank for whiteboard</a:t>
+            </a:r>
+            <a:endParaRPr kumimoji="0" lang="en-US" sz="3000" b="1" i="0" u="none" strike="noStrike" cap="none" spc="0" normalizeH="0" baseline="0" dirty="0">
+              <a:ln>
+                <a:noFill/>
+              </a:ln>
+              <a:solidFill>
+                <a:srgbClr val="000000"/>
+              </a:solidFill>
+              <a:effectLst/>
+              <a:uFillTx/>
+              <a:latin typeface="Helvetica Neue"/>
+              <a:ea typeface="Helvetica Neue"/>
+              <a:cs typeface="Helvetica Neue"/>
+              <a:sym typeface="Helvetica Neue"/>
+            </a:endParaRPr>
+          </a:p>
+        </p:txBody>
+      </p:sp>
+    </p:spTree>
+    <p:extLst>
+      <p:ext uri="{BB962C8B-B14F-4D97-AF65-F5344CB8AC3E}">
+        <p14:creationId xmlns:p14="http://schemas.microsoft.com/office/powerpoint/2010/main" val="1775151055"/>
+      </p:ext>
+    </p:extLst>
+  </p:cSld>
+  <p:clrMapOvr>
+    <a:masterClrMapping/>
+  </p:clrMapOvr>
+  <p:transition spd="med"/>
+</p:sld>
+</file>
+
+<file path=ppt/slides/slide11.xml><?xml version="1.0" encoding="utf-8"?>
+<p:sld xmlns:a="http://schemas.openxmlformats.org/drawingml/2006/main" xmlns:r="http://schemas.openxmlformats.org/officeDocument/2006/relationships" xmlns:p="http://schemas.openxmlformats.org/presentationml/2006/main">
+  <p:cSld>
+    <p:spTree>
+      <p:nvGrpSpPr>
+        <p:cNvPr id="1" name=""/>
+        <p:cNvGrpSpPr/>
+        <p:nvPr/>
+      </p:nvGrpSpPr>
+      <p:grpSpPr>
+        <a:xfrm>
+          <a:off x="0" y="0"/>
+          <a:ext cx="0" cy="0"/>
+          <a:chOff x="0" y="0"/>
+          <a:chExt cx="0" cy="0"/>
+        </a:xfrm>
+      </p:grpSpPr>
+      <p:sp>
+        <p:nvSpPr>
+          <p:cNvPr id="6" name="TextBox 5"/>
+          <p:cNvSpPr txBox="1"/>
+          <p:nvPr/>
+        </p:nvSpPr>
+        <p:spPr>
+          <a:xfrm>
+            <a:off x="6237111" y="12728316"/>
+            <a:ext cx="13095111" cy="564257"/>
+          </a:xfrm>
+          <a:prstGeom prst="rect">
+            <a:avLst/>
+          </a:prstGeom>
+          <a:noFill/>
+          <a:ln w="12700" cap="flat">
+            <a:noFill/>
+            <a:miter lim="400000"/>
+          </a:ln>
+          <a:effectLst/>
+          <a:sp3d/>
+        </p:spPr>
+        <p:style>
+          <a:lnRef idx="0">
+            <a:scrgbClr r="0" g="0" b="0"/>
+          </a:lnRef>
+          <a:fillRef idx="0">
+            <a:scrgbClr r="0" g="0" b="0"/>
+          </a:fillRef>
+          <a:effectRef idx="0">
+            <a:scrgbClr r="0" g="0" b="0"/>
+          </a:effectRef>
+          <a:fontRef idx="none"/>
+        </p:style>
+        <p:txBody>
+          <a:bodyPr rot="0" spcFirstLastPara="1" vertOverflow="overflow" horzOverflow="overflow" vert="horz" wrap="square" lIns="50800" tIns="50800" rIns="50800" bIns="50800" numCol="1" spcCol="38100" rtlCol="0" anchor="ctr">
+            <a:spAutoFit/>
+          </a:bodyPr>
+          <a:lstStyle/>
+          <a:p>
+            <a:pPr marL="0" marR="0" indent="0" algn="ctr" defTabSz="825500" rtl="0" fontAlgn="auto" latinLnBrk="0" hangingPunct="0">
+              <a:lnSpc>
+                <a:spcPct val="100000"/>
+              </a:lnSpc>
+              <a:spcBef>
+                <a:spcPts val="0"/>
+              </a:spcBef>
+              <a:spcAft>
+                <a:spcPts val="0"/>
+              </a:spcAft>
+              <a:buClrTx/>
+              <a:buSzTx/>
+              <a:buFontTx/>
+              <a:buNone/>
+              <a:tabLst/>
+            </a:pPr>
+            <a:r>
+              <a:rPr kumimoji="0" lang="en-US" sz="3000" b="1" i="0" u="none" strike="noStrike" cap="none" spc="0" normalizeH="0" baseline="0" dirty="0">
+                <a:ln>
+                  <a:noFill/>
+                </a:ln>
+                <a:solidFill>
+                  <a:srgbClr val="000000"/>
+                </a:solidFill>
+                <a:effectLst/>
+                <a:uFillTx/>
+                <a:latin typeface="Helvetica Neue"/>
+                <a:ea typeface="Helvetica Neue"/>
+                <a:cs typeface="Helvetica Neue"/>
+                <a:sym typeface="Helvetica Neue"/>
+              </a:rPr>
+              <a:t>Thi</a:t>
+            </a:r>
+            <a:r>
+              <a:rPr lang="en-US" dirty="0"/>
+              <a:t>s slide left blank for whiteboard</a:t>
+            </a:r>
+            <a:endParaRPr kumimoji="0" lang="en-US" sz="3000" b="1" i="0" u="none" strike="noStrike" cap="none" spc="0" normalizeH="0" baseline="0" dirty="0">
+              <a:ln>
+                <a:noFill/>
+              </a:ln>
+              <a:solidFill>
+                <a:srgbClr val="000000"/>
+              </a:solidFill>
+              <a:effectLst/>
+              <a:uFillTx/>
+              <a:latin typeface="Helvetica Neue"/>
+              <a:ea typeface="Helvetica Neue"/>
+              <a:cs typeface="Helvetica Neue"/>
+              <a:sym typeface="Helvetica Neue"/>
+            </a:endParaRPr>
+          </a:p>
+        </p:txBody>
+      </p:sp>
+    </p:spTree>
+    <p:extLst>
+      <p:ext uri="{BB962C8B-B14F-4D97-AF65-F5344CB8AC3E}">
+        <p14:creationId xmlns:p14="http://schemas.microsoft.com/office/powerpoint/2010/main" val="732659638"/>
+      </p:ext>
+    </p:extLst>
+  </p:cSld>
+  <p:clrMapOvr>
+    <a:masterClrMapping/>
+  </p:clrMapOvr>
+  <p:transition spd="med"/>
+</p:sld>
+</file>
+
+<file path=ppt/slides/slide12.xml><?xml version="1.0" encoding="utf-8"?>
+<p:sld xmlns:a="http://schemas.openxmlformats.org/drawingml/2006/main" xmlns:r="http://schemas.openxmlformats.org/officeDocument/2006/relationships" xmlns:p="http://schemas.openxmlformats.org/presentationml/2006/main">
+  <p:cSld>
+    <p:spTree>
+      <p:nvGrpSpPr>
+        <p:cNvPr id="1" name=""/>
+        <p:cNvGrpSpPr/>
+        <p:nvPr/>
+      </p:nvGrpSpPr>
+      <p:grpSpPr>
+        <a:xfrm>
+          <a:off x="0" y="0"/>
+          <a:ext cx="0" cy="0"/>
+          <a:chOff x="0" y="0"/>
+          <a:chExt cx="0" cy="0"/>
+        </a:xfrm>
+      </p:grpSpPr>
+      <p:sp>
+        <p:nvSpPr>
+          <p:cNvPr id="6" name="TextBox 5"/>
+          <p:cNvSpPr txBox="1"/>
+          <p:nvPr/>
+        </p:nvSpPr>
+        <p:spPr>
+          <a:xfrm>
+            <a:off x="6237111" y="12728316"/>
+            <a:ext cx="13095111" cy="564257"/>
+          </a:xfrm>
+          <a:prstGeom prst="rect">
+            <a:avLst/>
+          </a:prstGeom>
+          <a:noFill/>
+          <a:ln w="12700" cap="flat">
+            <a:noFill/>
+            <a:miter lim="400000"/>
+          </a:ln>
+          <a:effectLst/>
+          <a:sp3d/>
+        </p:spPr>
+        <p:style>
+          <a:lnRef idx="0">
+            <a:scrgbClr r="0" g="0" b="0"/>
+          </a:lnRef>
+          <a:fillRef idx="0">
+            <a:scrgbClr r="0" g="0" b="0"/>
+          </a:fillRef>
+          <a:effectRef idx="0">
+            <a:scrgbClr r="0" g="0" b="0"/>
+          </a:effectRef>
+          <a:fontRef idx="none"/>
+        </p:style>
+        <p:txBody>
+          <a:bodyPr rot="0" spcFirstLastPara="1" vertOverflow="overflow" horzOverflow="overflow" vert="horz" wrap="square" lIns="50800" tIns="50800" rIns="50800" bIns="50800" numCol="1" spcCol="38100" rtlCol="0" anchor="ctr">
+            <a:spAutoFit/>
+          </a:bodyPr>
+          <a:lstStyle/>
+          <a:p>
+            <a:pPr marL="0" marR="0" indent="0" algn="ctr" defTabSz="825500" rtl="0" fontAlgn="auto" latinLnBrk="0" hangingPunct="0">
+              <a:lnSpc>
+                <a:spcPct val="100000"/>
+              </a:lnSpc>
+              <a:spcBef>
+                <a:spcPts val="0"/>
+              </a:spcBef>
+              <a:spcAft>
+                <a:spcPts val="0"/>
+              </a:spcAft>
+              <a:buClrTx/>
+              <a:buSzTx/>
+              <a:buFontTx/>
+              <a:buNone/>
+              <a:tabLst/>
+            </a:pPr>
+            <a:r>
+              <a:rPr kumimoji="0" lang="en-US" sz="3000" b="1" i="0" u="none" strike="noStrike" cap="none" spc="0" normalizeH="0" baseline="0" dirty="0">
+                <a:ln>
+                  <a:noFill/>
+                </a:ln>
+                <a:solidFill>
+                  <a:srgbClr val="000000"/>
+                </a:solidFill>
+                <a:effectLst/>
+                <a:uFillTx/>
+                <a:latin typeface="Helvetica Neue"/>
+                <a:ea typeface="Helvetica Neue"/>
+                <a:cs typeface="Helvetica Neue"/>
+                <a:sym typeface="Helvetica Neue"/>
+              </a:rPr>
+              <a:t>Thi</a:t>
+            </a:r>
+            <a:r>
+              <a:rPr lang="en-US" dirty="0"/>
+              <a:t>s slide left blank for whiteboard</a:t>
+            </a:r>
+            <a:endParaRPr kumimoji="0" lang="en-US" sz="3000" b="1" i="0" u="none" strike="noStrike" cap="none" spc="0" normalizeH="0" baseline="0" dirty="0">
+              <a:ln>
+                <a:noFill/>
+              </a:ln>
+              <a:solidFill>
+                <a:srgbClr val="000000"/>
+              </a:solidFill>
+              <a:effectLst/>
+              <a:uFillTx/>
+              <a:latin typeface="Helvetica Neue"/>
+              <a:ea typeface="Helvetica Neue"/>
+              <a:cs typeface="Helvetica Neue"/>
+              <a:sym typeface="Helvetica Neue"/>
+            </a:endParaRPr>
+          </a:p>
+        </p:txBody>
+      </p:sp>
+    </p:spTree>
+    <p:extLst>
+      <p:ext uri="{BB962C8B-B14F-4D97-AF65-F5344CB8AC3E}">
+        <p14:creationId xmlns:p14="http://schemas.microsoft.com/office/powerpoint/2010/main" val="1834453856"/>
+      </p:ext>
+    </p:extLst>
+  </p:cSld>
+  <p:clrMapOvr>
+    <a:masterClrMapping/>
+  </p:clrMapOvr>
+  <p:transition spd="med"/>
+</p:sld>
+</file>
+
+<file path=ppt/slides/slide13.xml><?xml version="1.0" encoding="utf-8"?>
+<p:sld xmlns:a="http://schemas.openxmlformats.org/drawingml/2006/main" xmlns:r="http://schemas.openxmlformats.org/officeDocument/2006/relationships" xmlns:p="http://schemas.openxmlformats.org/presentationml/2006/main">
+  <p:cSld>
+    <p:spTree>
+      <p:nvGrpSpPr>
+        <p:cNvPr id="1" name=""/>
+        <p:cNvGrpSpPr/>
+        <p:nvPr/>
+      </p:nvGrpSpPr>
+      <p:grpSpPr>
+        <a:xfrm>
+          <a:off x="0" y="0"/>
+          <a:ext cx="0" cy="0"/>
+          <a:chOff x="0" y="0"/>
+          <a:chExt cx="0" cy="0"/>
+        </a:xfrm>
+      </p:grpSpPr>
+      <p:sp>
+        <p:nvSpPr>
+          <p:cNvPr id="6" name="TextBox 5"/>
+          <p:cNvSpPr txBox="1"/>
+          <p:nvPr/>
+        </p:nvSpPr>
+        <p:spPr>
+          <a:xfrm>
+            <a:off x="6237111" y="12728316"/>
+            <a:ext cx="13095111" cy="564257"/>
+          </a:xfrm>
+          <a:prstGeom prst="rect">
+            <a:avLst/>
+          </a:prstGeom>
+          <a:noFill/>
+          <a:ln w="12700" cap="flat">
+            <a:noFill/>
+            <a:miter lim="400000"/>
+          </a:ln>
+          <a:effectLst/>
+          <a:sp3d/>
+        </p:spPr>
+        <p:style>
+          <a:lnRef idx="0">
+            <a:scrgbClr r="0" g="0" b="0"/>
+          </a:lnRef>
+          <a:fillRef idx="0">
+            <a:scrgbClr r="0" g="0" b="0"/>
+          </a:fillRef>
+          <a:effectRef idx="0">
+            <a:scrgbClr r="0" g="0" b="0"/>
+          </a:effectRef>
+          <a:fontRef idx="none"/>
+        </p:style>
+        <p:txBody>
+          <a:bodyPr rot="0" spcFirstLastPara="1" vertOverflow="overflow" horzOverflow="overflow" vert="horz" wrap="square" lIns="50800" tIns="50800" rIns="50800" bIns="50800" numCol="1" spcCol="38100" rtlCol="0" anchor="ctr">
+            <a:spAutoFit/>
+          </a:bodyPr>
+          <a:lstStyle/>
+          <a:p>
+            <a:pPr marL="0" marR="0" indent="0" algn="ctr" defTabSz="825500" rtl="0" fontAlgn="auto" latinLnBrk="0" hangingPunct="0">
+              <a:lnSpc>
+                <a:spcPct val="100000"/>
+              </a:lnSpc>
+              <a:spcBef>
+                <a:spcPts val="0"/>
+              </a:spcBef>
+              <a:spcAft>
+                <a:spcPts val="0"/>
+              </a:spcAft>
+              <a:buClrTx/>
+              <a:buSzTx/>
+              <a:buFontTx/>
+              <a:buNone/>
+              <a:tabLst/>
+            </a:pPr>
+            <a:r>
+              <a:rPr kumimoji="0" lang="en-US" sz="3000" b="1" i="0" u="none" strike="noStrike" cap="none" spc="0" normalizeH="0" baseline="0" dirty="0">
+                <a:ln>
+                  <a:noFill/>
+                </a:ln>
+                <a:solidFill>
+                  <a:srgbClr val="000000"/>
+                </a:solidFill>
+                <a:effectLst/>
+                <a:uFillTx/>
+                <a:latin typeface="Helvetica Neue"/>
+                <a:ea typeface="Helvetica Neue"/>
+                <a:cs typeface="Helvetica Neue"/>
+                <a:sym typeface="Helvetica Neue"/>
+              </a:rPr>
+              <a:t>Thi</a:t>
+            </a:r>
+            <a:r>
+              <a:rPr lang="en-US" dirty="0"/>
+              <a:t>s slide left blank for whiteboard</a:t>
+            </a:r>
+            <a:endParaRPr kumimoji="0" lang="en-US" sz="3000" b="1" i="0" u="none" strike="noStrike" cap="none" spc="0" normalizeH="0" baseline="0" dirty="0">
+              <a:ln>
+                <a:noFill/>
+              </a:ln>
+              <a:solidFill>
+                <a:srgbClr val="000000"/>
+              </a:solidFill>
+              <a:effectLst/>
+              <a:uFillTx/>
+              <a:latin typeface="Helvetica Neue"/>
+              <a:ea typeface="Helvetica Neue"/>
+              <a:cs typeface="Helvetica Neue"/>
+              <a:sym typeface="Helvetica Neue"/>
+            </a:endParaRPr>
+          </a:p>
+        </p:txBody>
+      </p:sp>
+    </p:spTree>
+    <p:extLst>
+      <p:ext uri="{BB962C8B-B14F-4D97-AF65-F5344CB8AC3E}">
+        <p14:creationId xmlns:p14="http://schemas.microsoft.com/office/powerpoint/2010/main" val="1519292140"/>
+      </p:ext>
+    </p:extLst>
+  </p:cSld>
+  <p:clrMapOvr>
+    <a:masterClrMapping/>
+  </p:clrMapOvr>
+  <p:transition spd="med"/>
+</p:sld>
+</file>
+
+<file path=ppt/slides/slide14.xml><?xml version="1.0" encoding="utf-8"?>
+<p:sld xmlns:a="http://schemas.openxmlformats.org/drawingml/2006/main" xmlns:r="http://schemas.openxmlformats.org/officeDocument/2006/relationships" xmlns:p="http://schemas.openxmlformats.org/presentationml/2006/main">
+  <p:cSld>
+    <p:spTree>
+      <p:nvGrpSpPr>
+        <p:cNvPr id="1" name=""/>
+        <p:cNvGrpSpPr/>
+        <p:nvPr/>
+      </p:nvGrpSpPr>
+      <p:grpSpPr>
+        <a:xfrm>
+          <a:off x="0" y="0"/>
+          <a:ext cx="0" cy="0"/>
+          <a:chOff x="0" y="0"/>
+          <a:chExt cx="0" cy="0"/>
+        </a:xfrm>
+      </p:grpSpPr>
+      <p:sp>
+        <p:nvSpPr>
+          <p:cNvPr id="6" name="TextBox 5"/>
+          <p:cNvSpPr txBox="1"/>
+          <p:nvPr/>
+        </p:nvSpPr>
+        <p:spPr>
+          <a:xfrm>
+            <a:off x="6237111" y="12728316"/>
+            <a:ext cx="13095111" cy="564257"/>
+          </a:xfrm>
+          <a:prstGeom prst="rect">
+            <a:avLst/>
+          </a:prstGeom>
+          <a:noFill/>
+          <a:ln w="12700" cap="flat">
+            <a:noFill/>
+            <a:miter lim="400000"/>
+          </a:ln>
+          <a:effectLst/>
+          <a:sp3d/>
+        </p:spPr>
+        <p:style>
+          <a:lnRef idx="0">
+            <a:scrgbClr r="0" g="0" b="0"/>
+          </a:lnRef>
+          <a:fillRef idx="0">
+            <a:scrgbClr r="0" g="0" b="0"/>
+          </a:fillRef>
+          <a:effectRef idx="0">
+            <a:scrgbClr r="0" g="0" b="0"/>
+          </a:effectRef>
+          <a:fontRef idx="none"/>
+        </p:style>
+        <p:txBody>
+          <a:bodyPr rot="0" spcFirstLastPara="1" vertOverflow="overflow" horzOverflow="overflow" vert="horz" wrap="square" lIns="50800" tIns="50800" rIns="50800" bIns="50800" numCol="1" spcCol="38100" rtlCol="0" anchor="ctr">
+            <a:spAutoFit/>
+          </a:bodyPr>
+          <a:lstStyle/>
+          <a:p>
+            <a:pPr marL="0" marR="0" indent="0" algn="ctr" defTabSz="825500" rtl="0" fontAlgn="auto" latinLnBrk="0" hangingPunct="0">
+              <a:lnSpc>
+                <a:spcPct val="100000"/>
+              </a:lnSpc>
+              <a:spcBef>
+                <a:spcPts val="0"/>
+              </a:spcBef>
+              <a:spcAft>
+                <a:spcPts val="0"/>
+              </a:spcAft>
+              <a:buClrTx/>
+              <a:buSzTx/>
+              <a:buFontTx/>
+              <a:buNone/>
+              <a:tabLst/>
+            </a:pPr>
+            <a:r>
+              <a:rPr kumimoji="0" lang="en-US" sz="3000" b="1" i="0" u="none" strike="noStrike" cap="none" spc="0" normalizeH="0" baseline="0" dirty="0">
+                <a:ln>
+                  <a:noFill/>
+                </a:ln>
+                <a:solidFill>
+                  <a:srgbClr val="000000"/>
+                </a:solidFill>
+                <a:effectLst/>
+                <a:uFillTx/>
+                <a:latin typeface="Helvetica Neue"/>
+                <a:ea typeface="Helvetica Neue"/>
+                <a:cs typeface="Helvetica Neue"/>
+                <a:sym typeface="Helvetica Neue"/>
+              </a:rPr>
+              <a:t>Thi</a:t>
+            </a:r>
+            <a:r>
+              <a:rPr lang="en-US" dirty="0"/>
+              <a:t>s slide left blank for whiteboard</a:t>
+            </a:r>
+            <a:endParaRPr kumimoji="0" lang="en-US" sz="3000" b="1" i="0" u="none" strike="noStrike" cap="none" spc="0" normalizeH="0" baseline="0" dirty="0">
+              <a:ln>
+                <a:noFill/>
+              </a:ln>
+              <a:solidFill>
+                <a:srgbClr val="000000"/>
+              </a:solidFill>
+              <a:effectLst/>
+              <a:uFillTx/>
+              <a:latin typeface="Helvetica Neue"/>
+              <a:ea typeface="Helvetica Neue"/>
+              <a:cs typeface="Helvetica Neue"/>
+              <a:sym typeface="Helvetica Neue"/>
+            </a:endParaRPr>
+          </a:p>
+        </p:txBody>
+      </p:sp>
+    </p:spTree>
+    <p:extLst>
+      <p:ext uri="{BB962C8B-B14F-4D97-AF65-F5344CB8AC3E}">
+        <p14:creationId xmlns:p14="http://schemas.microsoft.com/office/powerpoint/2010/main" val="1967969179"/>
+      </p:ext>
+    </p:extLst>
+  </p:cSld>
+  <p:clrMapOvr>
+    <a:masterClrMapping/>
+  </p:clrMapOvr>
+  <p:transition spd="med"/>
+</p:sld>
+</file>
+
+<file path=ppt/slides/slide15.xml><?xml version="1.0" encoding="utf-8"?>
+<p:sld xmlns:a="http://schemas.openxmlformats.org/drawingml/2006/main" xmlns:r="http://schemas.openxmlformats.org/officeDocument/2006/relationships" xmlns:p="http://schemas.openxmlformats.org/presentationml/2006/main">
+  <p:cSld>
+    <p:spTree>
+      <p:nvGrpSpPr>
+        <p:cNvPr id="1" name=""/>
+        <p:cNvGrpSpPr/>
+        <p:nvPr/>
+      </p:nvGrpSpPr>
+      <p:grpSpPr>
+        <a:xfrm>
+          <a:off x="0" y="0"/>
+          <a:ext cx="0" cy="0"/>
+          <a:chOff x="0" y="0"/>
+          <a:chExt cx="0" cy="0"/>
+        </a:xfrm>
+      </p:grpSpPr>
+      <p:sp>
+        <p:nvSpPr>
+          <p:cNvPr id="6" name="TextBox 5"/>
+          <p:cNvSpPr txBox="1"/>
+          <p:nvPr/>
+        </p:nvSpPr>
+        <p:spPr>
+          <a:xfrm>
+            <a:off x="6237111" y="12728316"/>
+            <a:ext cx="13095111" cy="564257"/>
+          </a:xfrm>
+          <a:prstGeom prst="rect">
+            <a:avLst/>
+          </a:prstGeom>
+          <a:noFill/>
+          <a:ln w="12700" cap="flat">
+            <a:noFill/>
+            <a:miter lim="400000"/>
+          </a:ln>
+          <a:effectLst/>
+          <a:sp3d/>
+        </p:spPr>
+        <p:style>
+          <a:lnRef idx="0">
+            <a:scrgbClr r="0" g="0" b="0"/>
+          </a:lnRef>
+          <a:fillRef idx="0">
+            <a:scrgbClr r="0" g="0" b="0"/>
+          </a:fillRef>
+          <a:effectRef idx="0">
+            <a:scrgbClr r="0" g="0" b="0"/>
+          </a:effectRef>
+          <a:fontRef idx="none"/>
+        </p:style>
+        <p:txBody>
+          <a:bodyPr rot="0" spcFirstLastPara="1" vertOverflow="overflow" horzOverflow="overflow" vert="horz" wrap="square" lIns="50800" tIns="50800" rIns="50800" bIns="50800" numCol="1" spcCol="38100" rtlCol="0" anchor="ctr">
+            <a:spAutoFit/>
+          </a:bodyPr>
+          <a:lstStyle/>
+          <a:p>
+            <a:pPr marL="0" marR="0" indent="0" algn="ctr" defTabSz="825500" rtl="0" fontAlgn="auto" latinLnBrk="0" hangingPunct="0">
+              <a:lnSpc>
+                <a:spcPct val="100000"/>
+              </a:lnSpc>
+              <a:spcBef>
+                <a:spcPts val="0"/>
+              </a:spcBef>
+              <a:spcAft>
+                <a:spcPts val="0"/>
+              </a:spcAft>
+              <a:buClrTx/>
+              <a:buSzTx/>
+              <a:buFontTx/>
+              <a:buNone/>
+              <a:tabLst/>
+            </a:pPr>
+            <a:r>
+              <a:rPr kumimoji="0" lang="en-US" sz="3000" b="1" i="0" u="none" strike="noStrike" cap="none" spc="0" normalizeH="0" baseline="0" dirty="0">
+                <a:ln>
+                  <a:noFill/>
+                </a:ln>
+                <a:solidFill>
+                  <a:srgbClr val="000000"/>
+                </a:solidFill>
+                <a:effectLst/>
+                <a:uFillTx/>
+                <a:latin typeface="Helvetica Neue"/>
+                <a:ea typeface="Helvetica Neue"/>
+                <a:cs typeface="Helvetica Neue"/>
+                <a:sym typeface="Helvetica Neue"/>
+              </a:rPr>
+              <a:t>Thi</a:t>
+            </a:r>
+            <a:r>
+              <a:rPr lang="en-US" dirty="0"/>
+              <a:t>s slide left blank for whiteboard</a:t>
+            </a:r>
+            <a:endParaRPr kumimoji="0" lang="en-US" sz="3000" b="1" i="0" u="none" strike="noStrike" cap="none" spc="0" normalizeH="0" baseline="0" dirty="0">
+              <a:ln>
+                <a:noFill/>
+              </a:ln>
+              <a:solidFill>
+                <a:srgbClr val="000000"/>
+              </a:solidFill>
+              <a:effectLst/>
+              <a:uFillTx/>
+              <a:latin typeface="Helvetica Neue"/>
+              <a:ea typeface="Helvetica Neue"/>
+              <a:cs typeface="Helvetica Neue"/>
+              <a:sym typeface="Helvetica Neue"/>
+            </a:endParaRPr>
+          </a:p>
+        </p:txBody>
+      </p:sp>
+    </p:spTree>
+    <p:extLst>
+      <p:ext uri="{BB962C8B-B14F-4D97-AF65-F5344CB8AC3E}">
+        <p14:creationId xmlns:p14="http://schemas.microsoft.com/office/powerpoint/2010/main" val="1019549509"/>
+      </p:ext>
+    </p:extLst>
+  </p:cSld>
+  <p:clrMapOvr>
+    <a:masterClrMapping/>
+  </p:clrMapOvr>
+  <p:transition spd="med"/>
+</p:sld>
+</file>
+
+<file path=ppt/slides/slide16.xml><?xml version="1.0" encoding="utf-8"?>
+<p:sld xmlns:a="http://schemas.openxmlformats.org/drawingml/2006/main" xmlns:r="http://schemas.openxmlformats.org/officeDocument/2006/relationships" xmlns:p="http://schemas.openxmlformats.org/presentationml/2006/main">
+  <p:cSld>
+    <p:spTree>
+      <p:nvGrpSpPr>
+        <p:cNvPr id="1" name=""/>
+        <p:cNvGrpSpPr/>
+        <p:nvPr/>
+      </p:nvGrpSpPr>
+      <p:grpSpPr>
+        <a:xfrm>
+          <a:off x="0" y="0"/>
+          <a:ext cx="0" cy="0"/>
+          <a:chOff x="0" y="0"/>
+          <a:chExt cx="0" cy="0"/>
+        </a:xfrm>
+      </p:grpSpPr>
+      <p:sp>
+        <p:nvSpPr>
+          <p:cNvPr id="6" name="TextBox 5"/>
+          <p:cNvSpPr txBox="1"/>
+          <p:nvPr/>
+        </p:nvSpPr>
+        <p:spPr>
+          <a:xfrm>
+            <a:off x="6237111" y="12728316"/>
+            <a:ext cx="13095111" cy="564257"/>
+          </a:xfrm>
+          <a:prstGeom prst="rect">
+            <a:avLst/>
+          </a:prstGeom>
+          <a:noFill/>
+          <a:ln w="12700" cap="flat">
+            <a:noFill/>
+            <a:miter lim="400000"/>
+          </a:ln>
+          <a:effectLst/>
+          <a:sp3d/>
+        </p:spPr>
+        <p:style>
+          <a:lnRef idx="0">
+            <a:scrgbClr r="0" g="0" b="0"/>
+          </a:lnRef>
+          <a:fillRef idx="0">
+            <a:scrgbClr r="0" g="0" b="0"/>
+          </a:fillRef>
+          <a:effectRef idx="0">
+            <a:scrgbClr r="0" g="0" b="0"/>
+          </a:effectRef>
+          <a:fontRef idx="none"/>
+        </p:style>
+        <p:txBody>
+          <a:bodyPr rot="0" spcFirstLastPara="1" vertOverflow="overflow" horzOverflow="overflow" vert="horz" wrap="square" lIns="50800" tIns="50800" rIns="50800" bIns="50800" numCol="1" spcCol="38100" rtlCol="0" anchor="ctr">
+            <a:spAutoFit/>
+          </a:bodyPr>
+          <a:lstStyle/>
+          <a:p>
+            <a:pPr marL="0" marR="0" indent="0" algn="ctr" defTabSz="825500" rtl="0" fontAlgn="auto" latinLnBrk="0" hangingPunct="0">
+              <a:lnSpc>
+                <a:spcPct val="100000"/>
+              </a:lnSpc>
+              <a:spcBef>
+                <a:spcPts val="0"/>
+              </a:spcBef>
+              <a:spcAft>
+                <a:spcPts val="0"/>
+              </a:spcAft>
+              <a:buClrTx/>
+              <a:buSzTx/>
+              <a:buFontTx/>
+              <a:buNone/>
+              <a:tabLst/>
+            </a:pPr>
+            <a:r>
+              <a:rPr kumimoji="0" lang="en-US" sz="3000" b="1" i="0" u="none" strike="noStrike" cap="none" spc="0" normalizeH="0" baseline="0" dirty="0">
+                <a:ln>
+                  <a:noFill/>
+                </a:ln>
+                <a:solidFill>
+                  <a:srgbClr val="000000"/>
+                </a:solidFill>
+                <a:effectLst/>
+                <a:uFillTx/>
+                <a:latin typeface="Helvetica Neue"/>
+                <a:ea typeface="Helvetica Neue"/>
+                <a:cs typeface="Helvetica Neue"/>
+                <a:sym typeface="Helvetica Neue"/>
+              </a:rPr>
+              <a:t>Thi</a:t>
+            </a:r>
+            <a:r>
+              <a:rPr lang="en-US" dirty="0"/>
+              <a:t>s slide left blank for whiteboard</a:t>
+            </a:r>
+            <a:endParaRPr kumimoji="0" lang="en-US" sz="3000" b="1" i="0" u="none" strike="noStrike" cap="none" spc="0" normalizeH="0" baseline="0" dirty="0">
+              <a:ln>
+                <a:noFill/>
+              </a:ln>
+              <a:solidFill>
+                <a:srgbClr val="000000"/>
+              </a:solidFill>
+              <a:effectLst/>
+              <a:uFillTx/>
+              <a:latin typeface="Helvetica Neue"/>
+              <a:ea typeface="Helvetica Neue"/>
+              <a:cs typeface="Helvetica Neue"/>
+              <a:sym typeface="Helvetica Neue"/>
+            </a:endParaRPr>
+          </a:p>
+        </p:txBody>
+      </p:sp>
+    </p:spTree>
+    <p:extLst>
+      <p:ext uri="{BB962C8B-B14F-4D97-AF65-F5344CB8AC3E}">
+        <p14:creationId xmlns:p14="http://schemas.microsoft.com/office/powerpoint/2010/main" val="2091204037"/>
+      </p:ext>
+    </p:extLst>
+  </p:cSld>
+  <p:clrMapOvr>
+    <a:masterClrMapping/>
+  </p:clrMapOvr>
+  <p:transition spd="med"/>
+</p:sld>
+</file>
+
+<file path=ppt/slides/slide17.xml><?xml version="1.0" encoding="utf-8"?>
+<p:sld xmlns:a="http://schemas.openxmlformats.org/drawingml/2006/main" xmlns:r="http://schemas.openxmlformats.org/officeDocument/2006/relationships" xmlns:p="http://schemas.openxmlformats.org/presentationml/2006/main">
+  <p:cSld>
+    <p:spTree>
+      <p:nvGrpSpPr>
+        <p:cNvPr id="1" name=""/>
+        <p:cNvGrpSpPr/>
+        <p:nvPr/>
+      </p:nvGrpSpPr>
+      <p:grpSpPr>
+        <a:xfrm>
+          <a:off x="0" y="0"/>
+          <a:ext cx="0" cy="0"/>
+          <a:chOff x="0" y="0"/>
+          <a:chExt cx="0" cy="0"/>
+        </a:xfrm>
+      </p:grpSpPr>
+      <p:sp>
+        <p:nvSpPr>
+          <p:cNvPr id="6" name="TextBox 5"/>
+          <p:cNvSpPr txBox="1"/>
+          <p:nvPr/>
+        </p:nvSpPr>
+        <p:spPr>
+          <a:xfrm>
+            <a:off x="6237111" y="12728316"/>
+            <a:ext cx="13095111" cy="564257"/>
+          </a:xfrm>
+          <a:prstGeom prst="rect">
+            <a:avLst/>
+          </a:prstGeom>
+          <a:noFill/>
+          <a:ln w="12700" cap="flat">
+            <a:noFill/>
+            <a:miter lim="400000"/>
+          </a:ln>
+          <a:effectLst/>
+          <a:sp3d/>
+        </p:spPr>
+        <p:style>
+          <a:lnRef idx="0">
+            <a:scrgbClr r="0" g="0" b="0"/>
+          </a:lnRef>
+          <a:fillRef idx="0">
+            <a:scrgbClr r="0" g="0" b="0"/>
+          </a:fillRef>
+          <a:effectRef idx="0">
+            <a:scrgbClr r="0" g="0" b="0"/>
+          </a:effectRef>
+          <a:fontRef idx="none"/>
+        </p:style>
+        <p:txBody>
+          <a:bodyPr rot="0" spcFirstLastPara="1" vertOverflow="overflow" horzOverflow="overflow" vert="horz" wrap="square" lIns="50800" tIns="50800" rIns="50800" bIns="50800" numCol="1" spcCol="38100" rtlCol="0" anchor="ctr">
+            <a:spAutoFit/>
+          </a:bodyPr>
+          <a:lstStyle/>
+          <a:p>
+            <a:pPr marL="0" marR="0" indent="0" algn="ctr" defTabSz="825500" rtl="0" fontAlgn="auto" latinLnBrk="0" hangingPunct="0">
+              <a:lnSpc>
+                <a:spcPct val="100000"/>
+              </a:lnSpc>
+              <a:spcBef>
+                <a:spcPts val="0"/>
+              </a:spcBef>
+              <a:spcAft>
+                <a:spcPts val="0"/>
+              </a:spcAft>
+              <a:buClrTx/>
+              <a:buSzTx/>
+              <a:buFontTx/>
+              <a:buNone/>
+              <a:tabLst/>
+            </a:pPr>
+            <a:r>
+              <a:rPr kumimoji="0" lang="en-US" sz="3000" b="1" i="0" u="none" strike="noStrike" cap="none" spc="0" normalizeH="0" baseline="0" dirty="0">
+                <a:ln>
+                  <a:noFill/>
+                </a:ln>
+                <a:solidFill>
+                  <a:srgbClr val="000000"/>
+                </a:solidFill>
+                <a:effectLst/>
+                <a:uFillTx/>
+                <a:latin typeface="Helvetica Neue"/>
+                <a:ea typeface="Helvetica Neue"/>
+                <a:cs typeface="Helvetica Neue"/>
+                <a:sym typeface="Helvetica Neue"/>
+              </a:rPr>
+              <a:t>Thi</a:t>
+            </a:r>
+            <a:r>
+              <a:rPr lang="en-US" dirty="0"/>
+              <a:t>s slide left blank for whiteboard</a:t>
+            </a:r>
+            <a:endParaRPr kumimoji="0" lang="en-US" sz="3000" b="1" i="0" u="none" strike="noStrike" cap="none" spc="0" normalizeH="0" baseline="0" dirty="0">
+              <a:ln>
+                <a:noFill/>
+              </a:ln>
+              <a:solidFill>
+                <a:srgbClr val="000000"/>
+              </a:solidFill>
+              <a:effectLst/>
+              <a:uFillTx/>
+              <a:latin typeface="Helvetica Neue"/>
+              <a:ea typeface="Helvetica Neue"/>
+              <a:cs typeface="Helvetica Neue"/>
+              <a:sym typeface="Helvetica Neue"/>
+            </a:endParaRPr>
+          </a:p>
+        </p:txBody>
+      </p:sp>
+    </p:spTree>
+    <p:extLst>
+      <p:ext uri="{BB962C8B-B14F-4D97-AF65-F5344CB8AC3E}">
+        <p14:creationId xmlns:p14="http://schemas.microsoft.com/office/powerpoint/2010/main" val="1879922999"/>
+      </p:ext>
+    </p:extLst>
+  </p:cSld>
+  <p:clrMapOvr>
+    <a:masterClrMapping/>
+  </p:clrMapOvr>
+  <p:transition spd="med"/>
+</p:sld>
+</file>
+
+<file path=ppt/slides/slide18.xml><?xml version="1.0" encoding="utf-8"?>
+<p:sld xmlns:a="http://schemas.openxmlformats.org/drawingml/2006/main" xmlns:r="http://schemas.openxmlformats.org/officeDocument/2006/relationships" xmlns:p="http://schemas.openxmlformats.org/presentationml/2006/main">
+  <p:cSld>
+    <p:spTree>
+      <p:nvGrpSpPr>
+        <p:cNvPr id="1" name=""/>
+        <p:cNvGrpSpPr/>
+        <p:nvPr/>
+      </p:nvGrpSpPr>
+      <p:grpSpPr>
+        <a:xfrm>
+          <a:off x="0" y="0"/>
+          <a:ext cx="0" cy="0"/>
+          <a:chOff x="0" y="0"/>
+          <a:chExt cx="0" cy="0"/>
+        </a:xfrm>
+      </p:grpSpPr>
+      <p:sp>
+        <p:nvSpPr>
+          <p:cNvPr id="6" name="TextBox 5"/>
+          <p:cNvSpPr txBox="1"/>
+          <p:nvPr/>
+        </p:nvSpPr>
+        <p:spPr>
+          <a:xfrm>
+            <a:off x="6237111" y="12728316"/>
+            <a:ext cx="13095111" cy="564257"/>
+          </a:xfrm>
+          <a:prstGeom prst="rect">
+            <a:avLst/>
+          </a:prstGeom>
+          <a:noFill/>
+          <a:ln w="12700" cap="flat">
+            <a:noFill/>
+            <a:miter lim="400000"/>
+          </a:ln>
+          <a:effectLst/>
+          <a:sp3d/>
+        </p:spPr>
+        <p:style>
+          <a:lnRef idx="0">
+            <a:scrgbClr r="0" g="0" b="0"/>
+          </a:lnRef>
+          <a:fillRef idx="0">
+            <a:scrgbClr r="0" g="0" b="0"/>
+          </a:fillRef>
+          <a:effectRef idx="0">
+            <a:scrgbClr r="0" g="0" b="0"/>
+          </a:effectRef>
+          <a:fontRef idx="none"/>
+        </p:style>
+        <p:txBody>
+          <a:bodyPr rot="0" spcFirstLastPara="1" vertOverflow="overflow" horzOverflow="overflow" vert="horz" wrap="square" lIns="50800" tIns="50800" rIns="50800" bIns="50800" numCol="1" spcCol="38100" rtlCol="0" anchor="ctr">
+            <a:spAutoFit/>
+          </a:bodyPr>
+          <a:lstStyle/>
+          <a:p>
+            <a:pPr marL="0" marR="0" indent="0" algn="ctr" defTabSz="825500" rtl="0" fontAlgn="auto" latinLnBrk="0" hangingPunct="0">
+              <a:lnSpc>
+                <a:spcPct val="100000"/>
+              </a:lnSpc>
+              <a:spcBef>
+                <a:spcPts val="0"/>
+              </a:spcBef>
+              <a:spcAft>
+                <a:spcPts val="0"/>
+              </a:spcAft>
+              <a:buClrTx/>
+              <a:buSzTx/>
+              <a:buFontTx/>
+              <a:buNone/>
+              <a:tabLst/>
+            </a:pPr>
+            <a:r>
+              <a:rPr kumimoji="0" lang="en-US" sz="3000" b="1" i="0" u="none" strike="noStrike" cap="none" spc="0" normalizeH="0" baseline="0" dirty="0">
+                <a:ln>
+                  <a:noFill/>
+                </a:ln>
+                <a:solidFill>
+                  <a:srgbClr val="000000"/>
+                </a:solidFill>
+                <a:effectLst/>
+                <a:uFillTx/>
+                <a:latin typeface="Helvetica Neue"/>
+                <a:ea typeface="Helvetica Neue"/>
+                <a:cs typeface="Helvetica Neue"/>
+                <a:sym typeface="Helvetica Neue"/>
+              </a:rPr>
+              <a:t>Thi</a:t>
+            </a:r>
+            <a:r>
+              <a:rPr lang="en-US" dirty="0"/>
+              <a:t>s slide left blank for whiteboard</a:t>
+            </a:r>
+            <a:endParaRPr kumimoji="0" lang="en-US" sz="3000" b="1" i="0" u="none" strike="noStrike" cap="none" spc="0" normalizeH="0" baseline="0" dirty="0">
+              <a:ln>
+                <a:noFill/>
+              </a:ln>
+              <a:solidFill>
+                <a:srgbClr val="000000"/>
+              </a:solidFill>
+              <a:effectLst/>
+              <a:uFillTx/>
+              <a:latin typeface="Helvetica Neue"/>
+              <a:ea typeface="Helvetica Neue"/>
+              <a:cs typeface="Helvetica Neue"/>
+              <a:sym typeface="Helvetica Neue"/>
+            </a:endParaRPr>
+          </a:p>
+        </p:txBody>
+      </p:sp>
+    </p:spTree>
+    <p:extLst>
+      <p:ext uri="{BB962C8B-B14F-4D97-AF65-F5344CB8AC3E}">
+        <p14:creationId xmlns:p14="http://schemas.microsoft.com/office/powerpoint/2010/main" val="2219195757"/>
+      </p:ext>
+    </p:extLst>
+  </p:cSld>
+  <p:clrMapOvr>
+    <a:masterClrMapping/>
+  </p:clrMapOvr>
+  <p:transition spd="med"/>
+</p:sld>
+</file>
+
+<file path=ppt/slides/slide19.xml><?xml version="1.0" encoding="utf-8"?>
+<p:sld xmlns:a="http://schemas.openxmlformats.org/drawingml/2006/main" xmlns:r="http://schemas.openxmlformats.org/officeDocument/2006/relationships" xmlns:p="http://schemas.openxmlformats.org/presentationml/2006/main">
+  <p:cSld>
+    <p:spTree>
+      <p:nvGrpSpPr>
+        <p:cNvPr id="1" name=""/>
+        <p:cNvGrpSpPr/>
+        <p:nvPr/>
+      </p:nvGrpSpPr>
+      <p:grpSpPr>
+        <a:xfrm>
+          <a:off x="0" y="0"/>
+          <a:ext cx="0" cy="0"/>
+          <a:chOff x="0" y="0"/>
+          <a:chExt cx="0" cy="0"/>
+        </a:xfrm>
+      </p:grpSpPr>
+      <p:sp>
+        <p:nvSpPr>
+          <p:cNvPr id="6" name="TextBox 5"/>
+          <p:cNvSpPr txBox="1"/>
+          <p:nvPr/>
+        </p:nvSpPr>
+        <p:spPr>
+          <a:xfrm>
+            <a:off x="6237111" y="12728316"/>
+            <a:ext cx="13095111" cy="564257"/>
+          </a:xfrm>
+          <a:prstGeom prst="rect">
+            <a:avLst/>
+          </a:prstGeom>
+          <a:noFill/>
+          <a:ln w="12700" cap="flat">
+            <a:noFill/>
+            <a:miter lim="400000"/>
+          </a:ln>
+          <a:effectLst/>
+          <a:sp3d/>
+        </p:spPr>
+        <p:style>
+          <a:lnRef idx="0">
+            <a:scrgbClr r="0" g="0" b="0"/>
+          </a:lnRef>
+          <a:fillRef idx="0">
+            <a:scrgbClr r="0" g="0" b="0"/>
+          </a:fillRef>
+          <a:effectRef idx="0">
+            <a:scrgbClr r="0" g="0" b="0"/>
+          </a:effectRef>
+          <a:fontRef idx="none"/>
+        </p:style>
+        <p:txBody>
+          <a:bodyPr rot="0" spcFirstLastPara="1" vertOverflow="overflow" horzOverflow="overflow" vert="horz" wrap="square" lIns="50800" tIns="50800" rIns="50800" bIns="50800" numCol="1" spcCol="38100" rtlCol="0" anchor="ctr">
+            <a:spAutoFit/>
+          </a:bodyPr>
+          <a:lstStyle/>
+          <a:p>
+            <a:pPr marL="0" marR="0" indent="0" algn="ctr" defTabSz="825500" rtl="0" fontAlgn="auto" latinLnBrk="0" hangingPunct="0">
+              <a:lnSpc>
+                <a:spcPct val="100000"/>
+              </a:lnSpc>
+              <a:spcBef>
+                <a:spcPts val="0"/>
+              </a:spcBef>
+              <a:spcAft>
+                <a:spcPts val="0"/>
+              </a:spcAft>
+              <a:buClrTx/>
+              <a:buSzTx/>
+              <a:buFontTx/>
+              <a:buNone/>
+              <a:tabLst/>
+            </a:pPr>
+            <a:r>
+              <a:rPr kumimoji="0" lang="en-US" sz="3000" b="1" i="0" u="none" strike="noStrike" cap="none" spc="0" normalizeH="0" baseline="0" dirty="0">
+                <a:ln>
+                  <a:noFill/>
+                </a:ln>
+                <a:solidFill>
+                  <a:srgbClr val="000000"/>
+                </a:solidFill>
+                <a:effectLst/>
+                <a:uFillTx/>
+                <a:latin typeface="Helvetica Neue"/>
+                <a:ea typeface="Helvetica Neue"/>
+                <a:cs typeface="Helvetica Neue"/>
+                <a:sym typeface="Helvetica Neue"/>
+              </a:rPr>
+              <a:t>Thi</a:t>
+            </a:r>
+            <a:r>
+              <a:rPr lang="en-US" dirty="0"/>
+              <a:t>s slide left blank for whiteboard</a:t>
+            </a:r>
+            <a:endParaRPr kumimoji="0" lang="en-US" sz="3000" b="1" i="0" u="none" strike="noStrike" cap="none" spc="0" normalizeH="0" baseline="0" dirty="0">
+              <a:ln>
+                <a:noFill/>
+              </a:ln>
+              <a:solidFill>
+                <a:srgbClr val="000000"/>
+              </a:solidFill>
+              <a:effectLst/>
+              <a:uFillTx/>
+              <a:latin typeface="Helvetica Neue"/>
+              <a:ea typeface="Helvetica Neue"/>
+              <a:cs typeface="Helvetica Neue"/>
+              <a:sym typeface="Helvetica Neue"/>
+            </a:endParaRPr>
+          </a:p>
+        </p:txBody>
+      </p:sp>
+    </p:spTree>
+    <p:extLst>
+      <p:ext uri="{BB962C8B-B14F-4D97-AF65-F5344CB8AC3E}">
+        <p14:creationId xmlns:p14="http://schemas.microsoft.com/office/powerpoint/2010/main" val="2411760225"/>
+      </p:ext>
+    </p:extLst>
+  </p:cSld>
+  <p:clrMapOvr>
+    <a:masterClrMapping/>
+  </p:clrMapOvr>
+  <p:transition spd="med"/>
 </p:sld>
 </file>
 
@@ -5172,7 +6432,7 @@
               <a:tabLst/>
             </a:pPr>
             <a:r>
-              <a:rPr kumimoji="0" lang="en-US" sz="3000" b="1" i="0" u="none" strike="noStrike" cap="none" spc="0" normalizeH="0" baseline="0" dirty="0" smtClean="0">
+              <a:rPr kumimoji="0" lang="en-US" sz="3000" b="1" i="0" u="none" strike="noStrike" cap="none" spc="0" normalizeH="0" baseline="0" dirty="0">
                 <a:ln>
                   <a:noFill/>
                 </a:ln>
@@ -5189,7 +6449,7 @@
               <a:t>Thi</a:t>
             </a:r>
             <a:r>
-              <a:rPr lang="en-US" dirty="0" smtClean="0"/>
+              <a:rPr lang="en-US" dirty="0"/>
               <a:t>s slide left blank for whiteboard</a:t>
             </a:r>
             <a:endParaRPr kumimoji="0" lang="en-US" sz="3000" b="1" i="0" u="none" strike="noStrike" cap="none" spc="0" normalizeH="0" baseline="0" dirty="0">
@@ -5219,7 +6479,132 @@
   <p:clrMapOvr>
     <a:masterClrMapping/>
   </p:clrMapOvr>
-  <p:transition xmlns:p14="http://schemas.microsoft.com/office/powerpoint/2010/main" spd="med"/>
+  <p:transition spd="med"/>
+</p:sld>
+</file>
+
+<file path=ppt/slides/slide20.xml><?xml version="1.0" encoding="utf-8"?>
+<p:sld xmlns:a="http://schemas.openxmlformats.org/drawingml/2006/main" xmlns:r="http://schemas.openxmlformats.org/officeDocument/2006/relationships" xmlns:p="http://schemas.openxmlformats.org/presentationml/2006/main">
+  <p:cSld>
+    <p:spTree>
+      <p:nvGrpSpPr>
+        <p:cNvPr id="1" name=""/>
+        <p:cNvGrpSpPr/>
+        <p:nvPr/>
+      </p:nvGrpSpPr>
+      <p:grpSpPr>
+        <a:xfrm>
+          <a:off x="0" y="0"/>
+          <a:ext cx="0" cy="0"/>
+          <a:chOff x="0" y="0"/>
+          <a:chExt cx="0" cy="0"/>
+        </a:xfrm>
+      </p:grpSpPr>
+      <p:sp>
+        <p:nvSpPr>
+          <p:cNvPr id="6" name="TextBox 5"/>
+          <p:cNvSpPr txBox="1"/>
+          <p:nvPr/>
+        </p:nvSpPr>
+        <p:spPr>
+          <a:xfrm>
+            <a:off x="6237111" y="12728316"/>
+            <a:ext cx="13095111" cy="564257"/>
+          </a:xfrm>
+          <a:prstGeom prst="rect">
+            <a:avLst/>
+          </a:prstGeom>
+          <a:noFill/>
+          <a:ln w="12700" cap="flat">
+            <a:noFill/>
+            <a:miter lim="400000"/>
+          </a:ln>
+          <a:effectLst/>
+          <a:sp3d/>
+        </p:spPr>
+        <p:style>
+          <a:lnRef idx="0">
+            <a:scrgbClr r="0" g="0" b="0"/>
+          </a:lnRef>
+          <a:fillRef idx="0">
+            <a:scrgbClr r="0" g="0" b="0"/>
+          </a:fillRef>
+          <a:effectRef idx="0">
+            <a:scrgbClr r="0" g="0" b="0"/>
+          </a:effectRef>
+          <a:fontRef idx="none"/>
+        </p:style>
+        <p:txBody>
+          <a:bodyPr rot="0" spcFirstLastPara="1" vertOverflow="overflow" horzOverflow="overflow" vert="horz" wrap="square" lIns="50800" tIns="50800" rIns="50800" bIns="50800" numCol="1" spcCol="38100" rtlCol="0" anchor="ctr">
+            <a:spAutoFit/>
+          </a:bodyPr>
+          <a:lstStyle/>
+          <a:p>
+            <a:pPr marL="0" marR="0" indent="0" algn="ctr" defTabSz="825500" rtl="0" fontAlgn="auto" latinLnBrk="0" hangingPunct="0">
+              <a:lnSpc>
+                <a:spcPct val="100000"/>
+              </a:lnSpc>
+              <a:spcBef>
+                <a:spcPts val="0"/>
+              </a:spcBef>
+              <a:spcAft>
+                <a:spcPts val="0"/>
+              </a:spcAft>
+              <a:buClrTx/>
+              <a:buSzTx/>
+              <a:buFontTx/>
+              <a:buNone/>
+              <a:tabLst/>
+            </a:pPr>
+            <a:r>
+              <a:rPr kumimoji="0" lang="en-US" sz="3000" b="1" i="0" u="none" strike="noStrike" cap="none" spc="0" normalizeH="0" baseline="0" dirty="0">
+                <a:ln>
+                  <a:noFill/>
+                </a:ln>
+                <a:solidFill>
+                  <a:srgbClr val="000000"/>
+                </a:solidFill>
+                <a:effectLst/>
+                <a:uFillTx/>
+                <a:latin typeface="Helvetica Neue"/>
+                <a:ea typeface="Helvetica Neue"/>
+                <a:cs typeface="Helvetica Neue"/>
+                <a:sym typeface="Helvetica Neue"/>
+              </a:rPr>
+              <a:t>Thi</a:t>
+            </a:r>
+            <a:r>
+              <a:rPr lang="en-US" dirty="0"/>
+              <a:t>s slide left blank for whiteboard</a:t>
+            </a:r>
+            <a:endParaRPr kumimoji="0" lang="en-US" sz="3000" b="1" i="0" u="none" strike="noStrike" cap="none" spc="0" normalizeH="0" baseline="0" dirty="0">
+              <a:ln>
+                <a:noFill/>
+              </a:ln>
+              <a:solidFill>
+                <a:srgbClr val="000000"/>
+              </a:solidFill>
+              <a:effectLst/>
+              <a:uFillTx/>
+              <a:latin typeface="Helvetica Neue"/>
+              <a:ea typeface="Helvetica Neue"/>
+              <a:cs typeface="Helvetica Neue"/>
+              <a:sym typeface="Helvetica Neue"/>
+            </a:endParaRPr>
+          </a:p>
+        </p:txBody>
+      </p:sp>
+    </p:spTree>
+    <p:extLst>
+      <p:ext uri="{BB962C8B-B14F-4D97-AF65-F5344CB8AC3E}">
+        <p14:creationId xmlns:p14="http://schemas.microsoft.com/office/powerpoint/2010/main" val="4198219775"/>
+      </p:ext>
+    </p:extLst>
+  </p:cSld>
+  <p:clrMapOvr>
+    <a:masterClrMapping/>
+  </p:clrMapOvr>
+  <p:transition spd="med"/>
 </p:sld>
 </file>
 
@@ -5297,7 +6682,7 @@
               <a:tabLst/>
             </a:pPr>
             <a:r>
-              <a:rPr kumimoji="0" lang="en-US" sz="3000" b="1" i="0" u="none" strike="noStrike" cap="none" spc="0" normalizeH="0" baseline="0" dirty="0" smtClean="0">
+              <a:rPr kumimoji="0" lang="en-US" sz="3000" b="1" i="0" u="none" strike="noStrike" cap="none" spc="0" normalizeH="0" baseline="0" dirty="0">
                 <a:ln>
                   <a:noFill/>
                 </a:ln>
@@ -5314,7 +6699,7 @@
               <a:t>Thi</a:t>
             </a:r>
             <a:r>
-              <a:rPr lang="en-US" dirty="0" smtClean="0"/>
+              <a:rPr lang="en-US" dirty="0"/>
               <a:t>s slide left blank for whiteboard</a:t>
             </a:r>
             <a:endParaRPr kumimoji="0" lang="en-US" sz="3000" b="1" i="0" u="none" strike="noStrike" cap="none" spc="0" normalizeH="0" baseline="0" dirty="0">
@@ -5344,7 +6729,7 @@
   <p:clrMapOvr>
     <a:masterClrMapping/>
   </p:clrMapOvr>
-  <p:transition xmlns:p14="http://schemas.microsoft.com/office/powerpoint/2010/main" spd="med"/>
+  <p:transition spd="med"/>
 </p:sld>
 </file>
 
@@ -5422,7 +6807,7 @@
               <a:tabLst/>
             </a:pPr>
             <a:r>
-              <a:rPr kumimoji="0" lang="en-US" sz="3000" b="1" i="0" u="none" strike="noStrike" cap="none" spc="0" normalizeH="0" baseline="0" dirty="0" smtClean="0">
+              <a:rPr kumimoji="0" lang="en-US" sz="3000" b="1" i="0" u="none" strike="noStrike" cap="none" spc="0" normalizeH="0" baseline="0" dirty="0">
                 <a:ln>
                   <a:noFill/>
                 </a:ln>
@@ -5439,7 +6824,7 @@
               <a:t>Thi</a:t>
             </a:r>
             <a:r>
-              <a:rPr lang="en-US" dirty="0" smtClean="0"/>
+              <a:rPr lang="en-US" dirty="0"/>
               <a:t>s slide left blank for whiteboard</a:t>
             </a:r>
             <a:endParaRPr kumimoji="0" lang="en-US" sz="3000" b="1" i="0" u="none" strike="noStrike" cap="none" spc="0" normalizeH="0" baseline="0" dirty="0">
@@ -5469,7 +6854,7 @@
   <p:clrMapOvr>
     <a:masterClrMapping/>
   </p:clrMapOvr>
-  <p:transition xmlns:p14="http://schemas.microsoft.com/office/powerpoint/2010/main" spd="med"/>
+  <p:transition spd="med"/>
 </p:sld>
 </file>
 
@@ -5547,7 +6932,7 @@
               <a:tabLst/>
             </a:pPr>
             <a:r>
-              <a:rPr kumimoji="0" lang="en-US" sz="3000" b="1" i="0" u="none" strike="noStrike" cap="none" spc="0" normalizeH="0" baseline="0" dirty="0" smtClean="0">
+              <a:rPr kumimoji="0" lang="en-US" sz="3000" b="1" i="0" u="none" strike="noStrike" cap="none" spc="0" normalizeH="0" baseline="0" dirty="0">
                 <a:ln>
                   <a:noFill/>
                 </a:ln>
@@ -5564,7 +6949,7 @@
               <a:t>Thi</a:t>
             </a:r>
             <a:r>
-              <a:rPr lang="en-US" dirty="0" smtClean="0"/>
+              <a:rPr lang="en-US" dirty="0"/>
               <a:t>s slide left blank for whiteboard</a:t>
             </a:r>
             <a:endParaRPr kumimoji="0" lang="en-US" sz="3000" b="1" i="0" u="none" strike="noStrike" cap="none" spc="0" normalizeH="0" baseline="0" dirty="0">
@@ -5594,7 +6979,7 @@
   <p:clrMapOvr>
     <a:masterClrMapping/>
   </p:clrMapOvr>
-  <p:transition xmlns:p14="http://schemas.microsoft.com/office/powerpoint/2010/main" spd="med"/>
+  <p:transition spd="med"/>
 </p:sld>
 </file>
 
@@ -5672,7 +7057,7 @@
               <a:tabLst/>
             </a:pPr>
             <a:r>
-              <a:rPr kumimoji="0" lang="en-US" sz="3000" b="1" i="0" u="none" strike="noStrike" cap="none" spc="0" normalizeH="0" baseline="0" dirty="0" smtClean="0">
+              <a:rPr kumimoji="0" lang="en-US" sz="3000" b="1" i="0" u="none" strike="noStrike" cap="none" spc="0" normalizeH="0" baseline="0" dirty="0">
                 <a:ln>
                   <a:noFill/>
                 </a:ln>
@@ -5689,7 +7074,7 @@
               <a:t>Thi</a:t>
             </a:r>
             <a:r>
-              <a:rPr lang="en-US" dirty="0" smtClean="0"/>
+              <a:rPr lang="en-US" dirty="0"/>
               <a:t>s slide left blank for whiteboard</a:t>
             </a:r>
             <a:endParaRPr kumimoji="0" lang="en-US" sz="3000" b="1" i="0" u="none" strike="noStrike" cap="none" spc="0" normalizeH="0" baseline="0" dirty="0">
@@ -5719,7 +7104,382 @@
   <p:clrMapOvr>
     <a:masterClrMapping/>
   </p:clrMapOvr>
-  <p:transition xmlns:p14="http://schemas.microsoft.com/office/powerpoint/2010/main" spd="med"/>
+  <p:transition spd="med"/>
+</p:sld>
+</file>
+
+<file path=ppt/slides/slide7.xml><?xml version="1.0" encoding="utf-8"?>
+<p:sld xmlns:a="http://schemas.openxmlformats.org/drawingml/2006/main" xmlns:r="http://schemas.openxmlformats.org/officeDocument/2006/relationships" xmlns:p="http://schemas.openxmlformats.org/presentationml/2006/main">
+  <p:cSld>
+    <p:spTree>
+      <p:nvGrpSpPr>
+        <p:cNvPr id="1" name=""/>
+        <p:cNvGrpSpPr/>
+        <p:nvPr/>
+      </p:nvGrpSpPr>
+      <p:grpSpPr>
+        <a:xfrm>
+          <a:off x="0" y="0"/>
+          <a:ext cx="0" cy="0"/>
+          <a:chOff x="0" y="0"/>
+          <a:chExt cx="0" cy="0"/>
+        </a:xfrm>
+      </p:grpSpPr>
+      <p:sp>
+        <p:nvSpPr>
+          <p:cNvPr id="6" name="TextBox 5"/>
+          <p:cNvSpPr txBox="1"/>
+          <p:nvPr/>
+        </p:nvSpPr>
+        <p:spPr>
+          <a:xfrm>
+            <a:off x="6237111" y="12728316"/>
+            <a:ext cx="13095111" cy="564257"/>
+          </a:xfrm>
+          <a:prstGeom prst="rect">
+            <a:avLst/>
+          </a:prstGeom>
+          <a:noFill/>
+          <a:ln w="12700" cap="flat">
+            <a:noFill/>
+            <a:miter lim="400000"/>
+          </a:ln>
+          <a:effectLst/>
+          <a:sp3d/>
+        </p:spPr>
+        <p:style>
+          <a:lnRef idx="0">
+            <a:scrgbClr r="0" g="0" b="0"/>
+          </a:lnRef>
+          <a:fillRef idx="0">
+            <a:scrgbClr r="0" g="0" b="0"/>
+          </a:fillRef>
+          <a:effectRef idx="0">
+            <a:scrgbClr r="0" g="0" b="0"/>
+          </a:effectRef>
+          <a:fontRef idx="none"/>
+        </p:style>
+        <p:txBody>
+          <a:bodyPr rot="0" spcFirstLastPara="1" vertOverflow="overflow" horzOverflow="overflow" vert="horz" wrap="square" lIns="50800" tIns="50800" rIns="50800" bIns="50800" numCol="1" spcCol="38100" rtlCol="0" anchor="ctr">
+            <a:spAutoFit/>
+          </a:bodyPr>
+          <a:lstStyle/>
+          <a:p>
+            <a:pPr marL="0" marR="0" indent="0" algn="ctr" defTabSz="825500" rtl="0" fontAlgn="auto" latinLnBrk="0" hangingPunct="0">
+              <a:lnSpc>
+                <a:spcPct val="100000"/>
+              </a:lnSpc>
+              <a:spcBef>
+                <a:spcPts val="0"/>
+              </a:spcBef>
+              <a:spcAft>
+                <a:spcPts val="0"/>
+              </a:spcAft>
+              <a:buClrTx/>
+              <a:buSzTx/>
+              <a:buFontTx/>
+              <a:buNone/>
+              <a:tabLst/>
+            </a:pPr>
+            <a:r>
+              <a:rPr kumimoji="0" lang="en-US" sz="3000" b="1" i="0" u="none" strike="noStrike" cap="none" spc="0" normalizeH="0" baseline="0" dirty="0">
+                <a:ln>
+                  <a:noFill/>
+                </a:ln>
+                <a:solidFill>
+                  <a:srgbClr val="000000"/>
+                </a:solidFill>
+                <a:effectLst/>
+                <a:uFillTx/>
+                <a:latin typeface="Helvetica Neue"/>
+                <a:ea typeface="Helvetica Neue"/>
+                <a:cs typeface="Helvetica Neue"/>
+                <a:sym typeface="Helvetica Neue"/>
+              </a:rPr>
+              <a:t>Thi</a:t>
+            </a:r>
+            <a:r>
+              <a:rPr lang="en-US" dirty="0"/>
+              <a:t>s slide left blank for whiteboard</a:t>
+            </a:r>
+            <a:endParaRPr kumimoji="0" lang="en-US" sz="3000" b="1" i="0" u="none" strike="noStrike" cap="none" spc="0" normalizeH="0" baseline="0" dirty="0">
+              <a:ln>
+                <a:noFill/>
+              </a:ln>
+              <a:solidFill>
+                <a:srgbClr val="000000"/>
+              </a:solidFill>
+              <a:effectLst/>
+              <a:uFillTx/>
+              <a:latin typeface="Helvetica Neue"/>
+              <a:ea typeface="Helvetica Neue"/>
+              <a:cs typeface="Helvetica Neue"/>
+              <a:sym typeface="Helvetica Neue"/>
+            </a:endParaRPr>
+          </a:p>
+        </p:txBody>
+      </p:sp>
+    </p:spTree>
+    <p:extLst>
+      <p:ext uri="{BB962C8B-B14F-4D97-AF65-F5344CB8AC3E}">
+        <p14:creationId xmlns:p14="http://schemas.microsoft.com/office/powerpoint/2010/main" val="176299631"/>
+      </p:ext>
+    </p:extLst>
+  </p:cSld>
+  <p:clrMapOvr>
+    <a:masterClrMapping/>
+  </p:clrMapOvr>
+  <p:transition spd="med"/>
+</p:sld>
+</file>
+
+<file path=ppt/slides/slide8.xml><?xml version="1.0" encoding="utf-8"?>
+<p:sld xmlns:a="http://schemas.openxmlformats.org/drawingml/2006/main" xmlns:r="http://schemas.openxmlformats.org/officeDocument/2006/relationships" xmlns:p="http://schemas.openxmlformats.org/presentationml/2006/main">
+  <p:cSld>
+    <p:spTree>
+      <p:nvGrpSpPr>
+        <p:cNvPr id="1" name=""/>
+        <p:cNvGrpSpPr/>
+        <p:nvPr/>
+      </p:nvGrpSpPr>
+      <p:grpSpPr>
+        <a:xfrm>
+          <a:off x="0" y="0"/>
+          <a:ext cx="0" cy="0"/>
+          <a:chOff x="0" y="0"/>
+          <a:chExt cx="0" cy="0"/>
+        </a:xfrm>
+      </p:grpSpPr>
+      <p:sp>
+        <p:nvSpPr>
+          <p:cNvPr id="6" name="TextBox 5"/>
+          <p:cNvSpPr txBox="1"/>
+          <p:nvPr/>
+        </p:nvSpPr>
+        <p:spPr>
+          <a:xfrm>
+            <a:off x="6237111" y="12728316"/>
+            <a:ext cx="13095111" cy="564257"/>
+          </a:xfrm>
+          <a:prstGeom prst="rect">
+            <a:avLst/>
+          </a:prstGeom>
+          <a:noFill/>
+          <a:ln w="12700" cap="flat">
+            <a:noFill/>
+            <a:miter lim="400000"/>
+          </a:ln>
+          <a:effectLst/>
+          <a:sp3d/>
+        </p:spPr>
+        <p:style>
+          <a:lnRef idx="0">
+            <a:scrgbClr r="0" g="0" b="0"/>
+          </a:lnRef>
+          <a:fillRef idx="0">
+            <a:scrgbClr r="0" g="0" b="0"/>
+          </a:fillRef>
+          <a:effectRef idx="0">
+            <a:scrgbClr r="0" g="0" b="0"/>
+          </a:effectRef>
+          <a:fontRef idx="none"/>
+        </p:style>
+        <p:txBody>
+          <a:bodyPr rot="0" spcFirstLastPara="1" vertOverflow="overflow" horzOverflow="overflow" vert="horz" wrap="square" lIns="50800" tIns="50800" rIns="50800" bIns="50800" numCol="1" spcCol="38100" rtlCol="0" anchor="ctr">
+            <a:spAutoFit/>
+          </a:bodyPr>
+          <a:lstStyle/>
+          <a:p>
+            <a:pPr marL="0" marR="0" indent="0" algn="ctr" defTabSz="825500" rtl="0" fontAlgn="auto" latinLnBrk="0" hangingPunct="0">
+              <a:lnSpc>
+                <a:spcPct val="100000"/>
+              </a:lnSpc>
+              <a:spcBef>
+                <a:spcPts val="0"/>
+              </a:spcBef>
+              <a:spcAft>
+                <a:spcPts val="0"/>
+              </a:spcAft>
+              <a:buClrTx/>
+              <a:buSzTx/>
+              <a:buFontTx/>
+              <a:buNone/>
+              <a:tabLst/>
+            </a:pPr>
+            <a:r>
+              <a:rPr kumimoji="0" lang="en-US" sz="3000" b="1" i="0" u="none" strike="noStrike" cap="none" spc="0" normalizeH="0" baseline="0" dirty="0">
+                <a:ln>
+                  <a:noFill/>
+                </a:ln>
+                <a:solidFill>
+                  <a:srgbClr val="000000"/>
+                </a:solidFill>
+                <a:effectLst/>
+                <a:uFillTx/>
+                <a:latin typeface="Helvetica Neue"/>
+                <a:ea typeface="Helvetica Neue"/>
+                <a:cs typeface="Helvetica Neue"/>
+                <a:sym typeface="Helvetica Neue"/>
+              </a:rPr>
+              <a:t>Thi</a:t>
+            </a:r>
+            <a:r>
+              <a:rPr lang="en-US" dirty="0"/>
+              <a:t>s slide left blank for whiteboard</a:t>
+            </a:r>
+            <a:endParaRPr kumimoji="0" lang="en-US" sz="3000" b="1" i="0" u="none" strike="noStrike" cap="none" spc="0" normalizeH="0" baseline="0" dirty="0">
+              <a:ln>
+                <a:noFill/>
+              </a:ln>
+              <a:solidFill>
+                <a:srgbClr val="000000"/>
+              </a:solidFill>
+              <a:effectLst/>
+              <a:uFillTx/>
+              <a:latin typeface="Helvetica Neue"/>
+              <a:ea typeface="Helvetica Neue"/>
+              <a:cs typeface="Helvetica Neue"/>
+              <a:sym typeface="Helvetica Neue"/>
+            </a:endParaRPr>
+          </a:p>
+        </p:txBody>
+      </p:sp>
+    </p:spTree>
+    <p:extLst>
+      <p:ext uri="{BB962C8B-B14F-4D97-AF65-F5344CB8AC3E}">
+        <p14:creationId xmlns:p14="http://schemas.microsoft.com/office/powerpoint/2010/main" val="568924102"/>
+      </p:ext>
+    </p:extLst>
+  </p:cSld>
+  <p:clrMapOvr>
+    <a:masterClrMapping/>
+  </p:clrMapOvr>
+  <p:transition spd="med"/>
+</p:sld>
+</file>
+
+<file path=ppt/slides/slide9.xml><?xml version="1.0" encoding="utf-8"?>
+<p:sld xmlns:a="http://schemas.openxmlformats.org/drawingml/2006/main" xmlns:r="http://schemas.openxmlformats.org/officeDocument/2006/relationships" xmlns:p="http://schemas.openxmlformats.org/presentationml/2006/main">
+  <p:cSld>
+    <p:spTree>
+      <p:nvGrpSpPr>
+        <p:cNvPr id="1" name=""/>
+        <p:cNvGrpSpPr/>
+        <p:nvPr/>
+      </p:nvGrpSpPr>
+      <p:grpSpPr>
+        <a:xfrm>
+          <a:off x="0" y="0"/>
+          <a:ext cx="0" cy="0"/>
+          <a:chOff x="0" y="0"/>
+          <a:chExt cx="0" cy="0"/>
+        </a:xfrm>
+      </p:grpSpPr>
+      <p:sp>
+        <p:nvSpPr>
+          <p:cNvPr id="6" name="TextBox 5"/>
+          <p:cNvSpPr txBox="1"/>
+          <p:nvPr/>
+        </p:nvSpPr>
+        <p:spPr>
+          <a:xfrm>
+            <a:off x="6237111" y="12728316"/>
+            <a:ext cx="13095111" cy="564257"/>
+          </a:xfrm>
+          <a:prstGeom prst="rect">
+            <a:avLst/>
+          </a:prstGeom>
+          <a:noFill/>
+          <a:ln w="12700" cap="flat">
+            <a:noFill/>
+            <a:miter lim="400000"/>
+          </a:ln>
+          <a:effectLst/>
+          <a:sp3d/>
+        </p:spPr>
+        <p:style>
+          <a:lnRef idx="0">
+            <a:scrgbClr r="0" g="0" b="0"/>
+          </a:lnRef>
+          <a:fillRef idx="0">
+            <a:scrgbClr r="0" g="0" b="0"/>
+          </a:fillRef>
+          <a:effectRef idx="0">
+            <a:scrgbClr r="0" g="0" b="0"/>
+          </a:effectRef>
+          <a:fontRef idx="none"/>
+        </p:style>
+        <p:txBody>
+          <a:bodyPr rot="0" spcFirstLastPara="1" vertOverflow="overflow" horzOverflow="overflow" vert="horz" wrap="square" lIns="50800" tIns="50800" rIns="50800" bIns="50800" numCol="1" spcCol="38100" rtlCol="0" anchor="ctr">
+            <a:spAutoFit/>
+          </a:bodyPr>
+          <a:lstStyle/>
+          <a:p>
+            <a:pPr marL="0" marR="0" indent="0" algn="ctr" defTabSz="825500" rtl="0" fontAlgn="auto" latinLnBrk="0" hangingPunct="0">
+              <a:lnSpc>
+                <a:spcPct val="100000"/>
+              </a:lnSpc>
+              <a:spcBef>
+                <a:spcPts val="0"/>
+              </a:spcBef>
+              <a:spcAft>
+                <a:spcPts val="0"/>
+              </a:spcAft>
+              <a:buClrTx/>
+              <a:buSzTx/>
+              <a:buFontTx/>
+              <a:buNone/>
+              <a:tabLst/>
+            </a:pPr>
+            <a:r>
+              <a:rPr kumimoji="0" lang="en-US" sz="3000" b="1" i="0" u="none" strike="noStrike" cap="none" spc="0" normalizeH="0" baseline="0" dirty="0">
+                <a:ln>
+                  <a:noFill/>
+                </a:ln>
+                <a:solidFill>
+                  <a:srgbClr val="000000"/>
+                </a:solidFill>
+                <a:effectLst/>
+                <a:uFillTx/>
+                <a:latin typeface="Helvetica Neue"/>
+                <a:ea typeface="Helvetica Neue"/>
+                <a:cs typeface="Helvetica Neue"/>
+                <a:sym typeface="Helvetica Neue"/>
+              </a:rPr>
+              <a:t>Thi</a:t>
+            </a:r>
+            <a:r>
+              <a:rPr lang="en-US" dirty="0"/>
+              <a:t>s slide left blank for whiteboard</a:t>
+            </a:r>
+            <a:endParaRPr kumimoji="0" lang="en-US" sz="3000" b="1" i="0" u="none" strike="noStrike" cap="none" spc="0" normalizeH="0" baseline="0" dirty="0">
+              <a:ln>
+                <a:noFill/>
+              </a:ln>
+              <a:solidFill>
+                <a:srgbClr val="000000"/>
+              </a:solidFill>
+              <a:effectLst/>
+              <a:uFillTx/>
+              <a:latin typeface="Helvetica Neue"/>
+              <a:ea typeface="Helvetica Neue"/>
+              <a:cs typeface="Helvetica Neue"/>
+              <a:sym typeface="Helvetica Neue"/>
+            </a:endParaRPr>
+          </a:p>
+        </p:txBody>
+      </p:sp>
+    </p:spTree>
+    <p:extLst>
+      <p:ext uri="{BB962C8B-B14F-4D97-AF65-F5344CB8AC3E}">
+        <p14:creationId xmlns:p14="http://schemas.microsoft.com/office/powerpoint/2010/main" val="3755911299"/>
+      </p:ext>
+    </p:extLst>
+  </p:cSld>
+  <p:clrMapOvr>
+    <a:masterClrMapping/>
+  </p:clrMapOvr>
+  <p:transition spd="med"/>
 </p:sld>
 </file>
 

</xml_diff>